<commit_message>
Major update to task 1 and task 2 files
</commit_message>
<xml_diff>
--- a/task1/model_diagram.pptx
+++ b/task1/model_diagram.pptx
@@ -6,6 +6,7 @@
   </p:sldMasterIdLst>
   <p:sldIdLst>
     <p:sldId id="256" r:id="rId2"/>
+    <p:sldId id="257" r:id="rId3"/>
   </p:sldIdLst>
   <p:sldSz cx="12192000" cy="6858000"/>
   <p:notesSz cx="6858000" cy="9144000"/>
@@ -104,7 +105,248 @@
       </a:defRPr>
     </a:lvl9pPr>
   </p:defaultTextStyle>
+  <p:extLst>
+    <p:ext uri="{EFAFB233-063F-42B5-8137-9DF3F51BA10A}">
+      <p15:sldGuideLst xmlns:p15="http://schemas.microsoft.com/office/powerpoint/2012/main"/>
+    </p:ext>
+  </p:extLst>
 </p:presentation>
+</file>
+
+<file path=ppt/revisionInfo.xml><?xml version="1.0" encoding="utf-8"?>
+<p1510:revInfo xmlns:a="http://schemas.openxmlformats.org/drawingml/2006/main" xmlns:r="http://schemas.openxmlformats.org/officeDocument/2006/relationships" xmlns:p1510="http://schemas.microsoft.com/office/powerpoint/2015/10/main">
+  <p1510:revLst>
+    <p1510:client id="{A10B9406-4157-47E1-9855-C10D8547A56A}" v="20" dt="2023-04-14T08:52:10.912"/>
+  </p1510:revLst>
+</p1510:revInfo>
+</file>
+
+<file path=ppt/changesInfos/changesInfo1.xml><?xml version="1.0" encoding="utf-8"?>
+<pc:chgInfo xmlns:a="http://schemas.openxmlformats.org/drawingml/2006/main" xmlns:r="http://schemas.openxmlformats.org/officeDocument/2006/relationships" xmlns:ac="http://schemas.microsoft.com/office/drawing/2013/main/command" xmlns:pc="http://schemas.microsoft.com/office/powerpoint/2013/main/command">
+  <pc:docChgLst>
+    <pc:chgData name="Jayden Dzierbicki" userId="e5925774-a98c-41a3-99b4-5f1dd09761a3" providerId="ADAL" clId="{A10B9406-4157-47E1-9855-C10D8547A56A}"/>
+    <pc:docChg chg="undo custSel addSld modSld">
+      <pc:chgData name="Jayden Dzierbicki" userId="e5925774-a98c-41a3-99b4-5f1dd09761a3" providerId="ADAL" clId="{A10B9406-4157-47E1-9855-C10D8547A56A}" dt="2023-04-14T08:54:36.178" v="315" actId="14100"/>
+      <pc:docMkLst>
+        <pc:docMk/>
+      </pc:docMkLst>
+      <pc:sldChg chg="modSp mod">
+        <pc:chgData name="Jayden Dzierbicki" userId="e5925774-a98c-41a3-99b4-5f1dd09761a3" providerId="ADAL" clId="{A10B9406-4157-47E1-9855-C10D8547A56A}" dt="2023-04-14T03:07:35.007" v="0" actId="1076"/>
+        <pc:sldMkLst>
+          <pc:docMk/>
+          <pc:sldMk cId="834425203" sldId="256"/>
+        </pc:sldMkLst>
+        <pc:spChg chg="mod">
+          <ac:chgData name="Jayden Dzierbicki" userId="e5925774-a98c-41a3-99b4-5f1dd09761a3" providerId="ADAL" clId="{A10B9406-4157-47E1-9855-C10D8547A56A}" dt="2023-04-14T03:07:35.007" v="0" actId="1076"/>
+          <ac:spMkLst>
+            <pc:docMk/>
+            <pc:sldMk cId="834425203" sldId="256"/>
+            <ac:spMk id="23" creationId="{985586AE-33A5-08B5-FFD7-D07299703E2E}"/>
+          </ac:spMkLst>
+        </pc:spChg>
+        <pc:cxnChg chg="mod">
+          <ac:chgData name="Jayden Dzierbicki" userId="e5925774-a98c-41a3-99b4-5f1dd09761a3" providerId="ADAL" clId="{A10B9406-4157-47E1-9855-C10D8547A56A}" dt="2023-04-14T03:07:35.007" v="0" actId="1076"/>
+          <ac:cxnSpMkLst>
+            <pc:docMk/>
+            <pc:sldMk cId="834425203" sldId="256"/>
+            <ac:cxnSpMk id="24" creationId="{C43B82EF-D85D-8C9D-D086-CF30DF1FDED3}"/>
+          </ac:cxnSpMkLst>
+        </pc:cxnChg>
+        <pc:cxnChg chg="mod">
+          <ac:chgData name="Jayden Dzierbicki" userId="e5925774-a98c-41a3-99b4-5f1dd09761a3" providerId="ADAL" clId="{A10B9406-4157-47E1-9855-C10D8547A56A}" dt="2023-04-14T03:07:35.007" v="0" actId="1076"/>
+          <ac:cxnSpMkLst>
+            <pc:docMk/>
+            <pc:sldMk cId="834425203" sldId="256"/>
+            <ac:cxnSpMk id="30" creationId="{6176579B-C762-492C-9CDA-3604D5CF4530}"/>
+          </ac:cxnSpMkLst>
+        </pc:cxnChg>
+      </pc:sldChg>
+      <pc:sldChg chg="addSp delSp modSp new mod">
+        <pc:chgData name="Jayden Dzierbicki" userId="e5925774-a98c-41a3-99b4-5f1dd09761a3" providerId="ADAL" clId="{A10B9406-4157-47E1-9855-C10D8547A56A}" dt="2023-04-14T08:54:36.178" v="315" actId="14100"/>
+        <pc:sldMkLst>
+          <pc:docMk/>
+          <pc:sldMk cId="1268113905" sldId="257"/>
+        </pc:sldMkLst>
+        <pc:spChg chg="del">
+          <ac:chgData name="Jayden Dzierbicki" userId="e5925774-a98c-41a3-99b4-5f1dd09761a3" providerId="ADAL" clId="{A10B9406-4157-47E1-9855-C10D8547A56A}" dt="2023-04-14T08:44:11.971" v="2" actId="478"/>
+          <ac:spMkLst>
+            <pc:docMk/>
+            <pc:sldMk cId="1268113905" sldId="257"/>
+            <ac:spMk id="2" creationId="{05FDD36F-3D80-E5A2-D6A8-3593F6CA041B}"/>
+          </ac:spMkLst>
+        </pc:spChg>
+        <pc:spChg chg="del">
+          <ac:chgData name="Jayden Dzierbicki" userId="e5925774-a98c-41a3-99b4-5f1dd09761a3" providerId="ADAL" clId="{A10B9406-4157-47E1-9855-C10D8547A56A}" dt="2023-04-14T08:44:13.107" v="3" actId="478"/>
+          <ac:spMkLst>
+            <pc:docMk/>
+            <pc:sldMk cId="1268113905" sldId="257"/>
+            <ac:spMk id="3" creationId="{93352481-35D4-A5BC-50FE-6673DD36A525}"/>
+          </ac:spMkLst>
+        </pc:spChg>
+        <pc:spChg chg="add mod">
+          <ac:chgData name="Jayden Dzierbicki" userId="e5925774-a98c-41a3-99b4-5f1dd09761a3" providerId="ADAL" clId="{A10B9406-4157-47E1-9855-C10D8547A56A}" dt="2023-04-14T08:50:28.399" v="258" actId="1076"/>
+          <ac:spMkLst>
+            <pc:docMk/>
+            <pc:sldMk cId="1268113905" sldId="257"/>
+            <ac:spMk id="4" creationId="{859361C6-DB84-91B6-6474-A06A8E909681}"/>
+          </ac:spMkLst>
+        </pc:spChg>
+        <pc:spChg chg="add mod">
+          <ac:chgData name="Jayden Dzierbicki" userId="e5925774-a98c-41a3-99b4-5f1dd09761a3" providerId="ADAL" clId="{A10B9406-4157-47E1-9855-C10D8547A56A}" dt="2023-04-14T08:50:28.399" v="258" actId="1076"/>
+          <ac:spMkLst>
+            <pc:docMk/>
+            <pc:sldMk cId="1268113905" sldId="257"/>
+            <ac:spMk id="5" creationId="{CC1A650F-1839-DFD5-2A22-E7C04A3B5A9E}"/>
+          </ac:spMkLst>
+        </pc:spChg>
+        <pc:spChg chg="add mod">
+          <ac:chgData name="Jayden Dzierbicki" userId="e5925774-a98c-41a3-99b4-5f1dd09761a3" providerId="ADAL" clId="{A10B9406-4157-47E1-9855-C10D8547A56A}" dt="2023-04-14T08:50:28.399" v="258" actId="1076"/>
+          <ac:spMkLst>
+            <pc:docMk/>
+            <pc:sldMk cId="1268113905" sldId="257"/>
+            <ac:spMk id="6" creationId="{F0E424BD-6F92-BF7C-C257-97C31EA4103D}"/>
+          </ac:spMkLst>
+        </pc:spChg>
+        <pc:spChg chg="add del mod">
+          <ac:chgData name="Jayden Dzierbicki" userId="e5925774-a98c-41a3-99b4-5f1dd09761a3" providerId="ADAL" clId="{A10B9406-4157-47E1-9855-C10D8547A56A}" dt="2023-04-14T08:48:45.012" v="182" actId="478"/>
+          <ac:spMkLst>
+            <pc:docMk/>
+            <pc:sldMk cId="1268113905" sldId="257"/>
+            <ac:spMk id="7" creationId="{DF67FA86-082B-4B1E-C0D3-40111AA9A7D2}"/>
+          </ac:spMkLst>
+        </pc:spChg>
+        <pc:spChg chg="add mod">
+          <ac:chgData name="Jayden Dzierbicki" userId="e5925774-a98c-41a3-99b4-5f1dd09761a3" providerId="ADAL" clId="{A10B9406-4157-47E1-9855-C10D8547A56A}" dt="2023-04-14T08:50:28.399" v="258" actId="1076"/>
+          <ac:spMkLst>
+            <pc:docMk/>
+            <pc:sldMk cId="1268113905" sldId="257"/>
+            <ac:spMk id="20" creationId="{89E9DD70-FC25-2BC5-EFFB-80BA62D1D380}"/>
+          </ac:spMkLst>
+        </pc:spChg>
+        <pc:spChg chg="add mod">
+          <ac:chgData name="Jayden Dzierbicki" userId="e5925774-a98c-41a3-99b4-5f1dd09761a3" providerId="ADAL" clId="{A10B9406-4157-47E1-9855-C10D8547A56A}" dt="2023-04-14T08:50:28.399" v="258" actId="1076"/>
+          <ac:spMkLst>
+            <pc:docMk/>
+            <pc:sldMk cId="1268113905" sldId="257"/>
+            <ac:spMk id="21" creationId="{3719F581-D177-E07E-72F5-4935CAEA70C2}"/>
+          </ac:spMkLst>
+        </pc:spChg>
+        <pc:spChg chg="add mod">
+          <ac:chgData name="Jayden Dzierbicki" userId="e5925774-a98c-41a3-99b4-5f1dd09761a3" providerId="ADAL" clId="{A10B9406-4157-47E1-9855-C10D8547A56A}" dt="2023-04-14T08:50:28.399" v="258" actId="1076"/>
+          <ac:spMkLst>
+            <pc:docMk/>
+            <pc:sldMk cId="1268113905" sldId="257"/>
+            <ac:spMk id="22" creationId="{5BB1C09A-8749-96E5-D6D3-CEEC8D314123}"/>
+          </ac:spMkLst>
+        </pc:spChg>
+        <pc:spChg chg="add mod ord">
+          <ac:chgData name="Jayden Dzierbicki" userId="e5925774-a98c-41a3-99b4-5f1dd09761a3" providerId="ADAL" clId="{A10B9406-4157-47E1-9855-C10D8547A56A}" dt="2023-04-14T08:53:26.983" v="313" actId="14100"/>
+          <ac:spMkLst>
+            <pc:docMk/>
+            <pc:sldMk cId="1268113905" sldId="257"/>
+            <ac:spMk id="49" creationId="{046FC4EA-C2D9-752A-F083-DE6A47D3A280}"/>
+          </ac:spMkLst>
+        </pc:spChg>
+        <pc:spChg chg="add mod">
+          <ac:chgData name="Jayden Dzierbicki" userId="e5925774-a98c-41a3-99b4-5f1dd09761a3" providerId="ADAL" clId="{A10B9406-4157-47E1-9855-C10D8547A56A}" dt="2023-04-14T08:51:38.814" v="270" actId="20577"/>
+          <ac:spMkLst>
+            <pc:docMk/>
+            <pc:sldMk cId="1268113905" sldId="257"/>
+            <ac:spMk id="50" creationId="{4CCED4A7-2E89-D400-17B4-26DDAA4880CB}"/>
+          </ac:spMkLst>
+        </pc:spChg>
+        <pc:spChg chg="add mod ord">
+          <ac:chgData name="Jayden Dzierbicki" userId="e5925774-a98c-41a3-99b4-5f1dd09761a3" providerId="ADAL" clId="{A10B9406-4157-47E1-9855-C10D8547A56A}" dt="2023-04-14T08:52:01.081" v="281" actId="1076"/>
+          <ac:spMkLst>
+            <pc:docMk/>
+            <pc:sldMk cId="1268113905" sldId="257"/>
+            <ac:spMk id="59" creationId="{D614718C-1ED6-64EA-06B1-FE619507F983}"/>
+          </ac:spMkLst>
+        </pc:spChg>
+        <pc:spChg chg="add mod">
+          <ac:chgData name="Jayden Dzierbicki" userId="e5925774-a98c-41a3-99b4-5f1dd09761a3" providerId="ADAL" clId="{A10B9406-4157-47E1-9855-C10D8547A56A}" dt="2023-04-14T08:52:03.053" v="282" actId="1076"/>
+          <ac:spMkLst>
+            <pc:docMk/>
+            <pc:sldMk cId="1268113905" sldId="257"/>
+            <ac:spMk id="60" creationId="{B1291DF9-C436-5FEA-723D-C84DC1785122}"/>
+          </ac:spMkLst>
+        </pc:spChg>
+        <pc:spChg chg="add mod">
+          <ac:chgData name="Jayden Dzierbicki" userId="e5925774-a98c-41a3-99b4-5f1dd09761a3" providerId="ADAL" clId="{A10B9406-4157-47E1-9855-C10D8547A56A}" dt="2023-04-14T08:52:06.034" v="284" actId="1076"/>
+          <ac:spMkLst>
+            <pc:docMk/>
+            <pc:sldMk cId="1268113905" sldId="257"/>
+            <ac:spMk id="61" creationId="{2A6691AB-74B9-2CAA-90D6-22B9DF70F3ED}"/>
+          </ac:spMkLst>
+        </pc:spChg>
+        <pc:spChg chg="add mod">
+          <ac:chgData name="Jayden Dzierbicki" userId="e5925774-a98c-41a3-99b4-5f1dd09761a3" providerId="ADAL" clId="{A10B9406-4157-47E1-9855-C10D8547A56A}" dt="2023-04-14T08:52:20.364" v="310" actId="20577"/>
+          <ac:spMkLst>
+            <pc:docMk/>
+            <pc:sldMk cId="1268113905" sldId="257"/>
+            <ac:spMk id="62" creationId="{9C08D9A5-98D1-2A1F-5AFC-B97DBC71B7F1}"/>
+          </ac:spMkLst>
+        </pc:spChg>
+        <pc:cxnChg chg="add mod">
+          <ac:chgData name="Jayden Dzierbicki" userId="e5925774-a98c-41a3-99b4-5f1dd09761a3" providerId="ADAL" clId="{A10B9406-4157-47E1-9855-C10D8547A56A}" dt="2023-04-14T08:50:28.399" v="258" actId="1076"/>
+          <ac:cxnSpMkLst>
+            <pc:docMk/>
+            <pc:sldMk cId="1268113905" sldId="257"/>
+            <ac:cxnSpMk id="8" creationId="{41C1E85E-33B6-DA00-7BB5-E7C9AE81EEEC}"/>
+          </ac:cxnSpMkLst>
+        </pc:cxnChg>
+        <pc:cxnChg chg="add mod">
+          <ac:chgData name="Jayden Dzierbicki" userId="e5925774-a98c-41a3-99b4-5f1dd09761a3" providerId="ADAL" clId="{A10B9406-4157-47E1-9855-C10D8547A56A}" dt="2023-04-14T08:50:28.399" v="258" actId="1076"/>
+          <ac:cxnSpMkLst>
+            <pc:docMk/>
+            <pc:sldMk cId="1268113905" sldId="257"/>
+            <ac:cxnSpMk id="11" creationId="{1865E325-A08C-5157-EA5D-C52AE4812776}"/>
+          </ac:cxnSpMkLst>
+        </pc:cxnChg>
+        <pc:cxnChg chg="add mod">
+          <ac:chgData name="Jayden Dzierbicki" userId="e5925774-a98c-41a3-99b4-5f1dd09761a3" providerId="ADAL" clId="{A10B9406-4157-47E1-9855-C10D8547A56A}" dt="2023-04-14T08:50:28.399" v="258" actId="1076"/>
+          <ac:cxnSpMkLst>
+            <pc:docMk/>
+            <pc:sldMk cId="1268113905" sldId="257"/>
+            <ac:cxnSpMk id="14" creationId="{7DF54CC5-F18E-83FE-5CE4-C9E4B4317C74}"/>
+          </ac:cxnSpMkLst>
+        </pc:cxnChg>
+        <pc:cxnChg chg="add del mod">
+          <ac:chgData name="Jayden Dzierbicki" userId="e5925774-a98c-41a3-99b4-5f1dd09761a3" providerId="ADAL" clId="{A10B9406-4157-47E1-9855-C10D8547A56A}" dt="2023-04-14T08:47:38.605" v="167"/>
+          <ac:cxnSpMkLst>
+            <pc:docMk/>
+            <pc:sldMk cId="1268113905" sldId="257"/>
+            <ac:cxnSpMk id="31" creationId="{1541105B-CD0B-199D-3BA4-95E4B8A8CDE1}"/>
+          </ac:cxnSpMkLst>
+        </pc:cxnChg>
+        <pc:cxnChg chg="add mod">
+          <ac:chgData name="Jayden Dzierbicki" userId="e5925774-a98c-41a3-99b4-5f1dd09761a3" providerId="ADAL" clId="{A10B9406-4157-47E1-9855-C10D8547A56A}" dt="2023-04-14T08:54:33.740" v="314" actId="14100"/>
+          <ac:cxnSpMkLst>
+            <pc:docMk/>
+            <pc:sldMk cId="1268113905" sldId="257"/>
+            <ac:cxnSpMk id="51" creationId="{D9716277-EFB3-0DE7-385D-EF326BF8EE84}"/>
+          </ac:cxnSpMkLst>
+        </pc:cxnChg>
+        <pc:cxnChg chg="add mod">
+          <ac:chgData name="Jayden Dzierbicki" userId="e5925774-a98c-41a3-99b4-5f1dd09761a3" providerId="ADAL" clId="{A10B9406-4157-47E1-9855-C10D8547A56A}" dt="2023-04-14T08:52:26.192" v="311" actId="14100"/>
+          <ac:cxnSpMkLst>
+            <pc:docMk/>
+            <pc:sldMk cId="1268113905" sldId="257"/>
+            <ac:cxnSpMk id="54" creationId="{B126DBE7-8C52-B30F-B934-AA9C41ED25DA}"/>
+          </ac:cxnSpMkLst>
+        </pc:cxnChg>
+        <pc:cxnChg chg="add mod">
+          <ac:chgData name="Jayden Dzierbicki" userId="e5925774-a98c-41a3-99b4-5f1dd09761a3" providerId="ADAL" clId="{A10B9406-4157-47E1-9855-C10D8547A56A}" dt="2023-04-14T08:54:36.178" v="315" actId="14100"/>
+          <ac:cxnSpMkLst>
+            <pc:docMk/>
+            <pc:sldMk cId="1268113905" sldId="257"/>
+            <ac:cxnSpMk id="56" creationId="{766EC8C4-559D-19C7-8825-CDDAD15C638F}"/>
+          </ac:cxnSpMkLst>
+        </pc:cxnChg>
+      </pc:sldChg>
+    </pc:docChg>
+  </pc:docChgLst>
+</pc:chgInfo>
 </file>
 
 <file path=ppt/slideLayouts/slideLayout1.xml><?xml version="1.0" encoding="utf-8"?>
@@ -256,7 +498,7 @@
           <a:p>
             <a:fld id="{DC9180F0-0672-4733-B150-EFAAB25D3A0F}" type="datetimeFigureOut">
               <a:rPr lang="en-AU" smtClean="0"/>
-              <a:t>13/04/2023</a:t>
+              <a:t>14/04/2023</a:t>
             </a:fld>
             <a:endParaRPr lang="en-AU"/>
           </a:p>
@@ -456,7 +698,7 @@
           <a:p>
             <a:fld id="{DC9180F0-0672-4733-B150-EFAAB25D3A0F}" type="datetimeFigureOut">
               <a:rPr lang="en-AU" smtClean="0"/>
-              <a:t>13/04/2023</a:t>
+              <a:t>14/04/2023</a:t>
             </a:fld>
             <a:endParaRPr lang="en-AU"/>
           </a:p>
@@ -666,7 +908,7 @@
           <a:p>
             <a:fld id="{DC9180F0-0672-4733-B150-EFAAB25D3A0F}" type="datetimeFigureOut">
               <a:rPr lang="en-AU" smtClean="0"/>
-              <a:t>13/04/2023</a:t>
+              <a:t>14/04/2023</a:t>
             </a:fld>
             <a:endParaRPr lang="en-AU"/>
           </a:p>
@@ -866,7 +1108,7 @@
           <a:p>
             <a:fld id="{DC9180F0-0672-4733-B150-EFAAB25D3A0F}" type="datetimeFigureOut">
               <a:rPr lang="en-AU" smtClean="0"/>
-              <a:t>13/04/2023</a:t>
+              <a:t>14/04/2023</a:t>
             </a:fld>
             <a:endParaRPr lang="en-AU"/>
           </a:p>
@@ -1142,7 +1384,7 @@
           <a:p>
             <a:fld id="{DC9180F0-0672-4733-B150-EFAAB25D3A0F}" type="datetimeFigureOut">
               <a:rPr lang="en-AU" smtClean="0"/>
-              <a:t>13/04/2023</a:t>
+              <a:t>14/04/2023</a:t>
             </a:fld>
             <a:endParaRPr lang="en-AU"/>
           </a:p>
@@ -1410,7 +1652,7 @@
           <a:p>
             <a:fld id="{DC9180F0-0672-4733-B150-EFAAB25D3A0F}" type="datetimeFigureOut">
               <a:rPr lang="en-AU" smtClean="0"/>
-              <a:t>13/04/2023</a:t>
+              <a:t>14/04/2023</a:t>
             </a:fld>
             <a:endParaRPr lang="en-AU"/>
           </a:p>
@@ -1825,7 +2067,7 @@
           <a:p>
             <a:fld id="{DC9180F0-0672-4733-B150-EFAAB25D3A0F}" type="datetimeFigureOut">
               <a:rPr lang="en-AU" smtClean="0"/>
-              <a:t>13/04/2023</a:t>
+              <a:t>14/04/2023</a:t>
             </a:fld>
             <a:endParaRPr lang="en-AU"/>
           </a:p>
@@ -1967,7 +2209,7 @@
           <a:p>
             <a:fld id="{DC9180F0-0672-4733-B150-EFAAB25D3A0F}" type="datetimeFigureOut">
               <a:rPr lang="en-AU" smtClean="0"/>
-              <a:t>13/04/2023</a:t>
+              <a:t>14/04/2023</a:t>
             </a:fld>
             <a:endParaRPr lang="en-AU"/>
           </a:p>
@@ -2080,7 +2322,7 @@
           <a:p>
             <a:fld id="{DC9180F0-0672-4733-B150-EFAAB25D3A0F}" type="datetimeFigureOut">
               <a:rPr lang="en-AU" smtClean="0"/>
-              <a:t>13/04/2023</a:t>
+              <a:t>14/04/2023</a:t>
             </a:fld>
             <a:endParaRPr lang="en-AU"/>
           </a:p>
@@ -2393,7 +2635,7 @@
           <a:p>
             <a:fld id="{DC9180F0-0672-4733-B150-EFAAB25D3A0F}" type="datetimeFigureOut">
               <a:rPr lang="en-AU" smtClean="0"/>
-              <a:t>13/04/2023</a:t>
+              <a:t>14/04/2023</a:t>
             </a:fld>
             <a:endParaRPr lang="en-AU"/>
           </a:p>
@@ -2682,7 +2924,7 @@
           <a:p>
             <a:fld id="{DC9180F0-0672-4733-B150-EFAAB25D3A0F}" type="datetimeFigureOut">
               <a:rPr lang="en-AU" smtClean="0"/>
-              <a:t>13/04/2023</a:t>
+              <a:t>14/04/2023</a:t>
             </a:fld>
             <a:endParaRPr lang="en-AU"/>
           </a:p>
@@ -2925,7 +3167,7 @@
           <a:p>
             <a:fld id="{DC9180F0-0672-4733-B150-EFAAB25D3A0F}" type="datetimeFigureOut">
               <a:rPr lang="en-AU" smtClean="0"/>
-              <a:t>13/04/2023</a:t>
+              <a:t>14/04/2023</a:t>
             </a:fld>
             <a:endParaRPr lang="en-AU"/>
           </a:p>
@@ -3758,7 +4000,7 @@
         </p:nvSpPr>
         <p:spPr>
           <a:xfrm>
-            <a:off x="3280826" y="2113471"/>
+            <a:off x="3280826" y="2113470"/>
             <a:ext cx="836762" cy="1082615"/>
           </a:xfrm>
           <a:prstGeom prst="can">
@@ -3825,7 +4067,7 @@
         <p:spPr>
           <a:xfrm flipH="1">
             <a:off x="3699207" y="1578808"/>
-            <a:ext cx="2920" cy="534663"/>
+            <a:ext cx="2920" cy="534662"/>
           </a:xfrm>
           <a:prstGeom prst="straightConnector1">
             <a:avLst/>
@@ -3917,8 +4159,8 @@
         </p:nvCxnSpPr>
         <p:spPr>
           <a:xfrm>
-            <a:off x="3699207" y="3196086"/>
-            <a:ext cx="0" cy="1749308"/>
+            <a:off x="3699207" y="3196085"/>
+            <a:ext cx="0" cy="1749309"/>
           </a:xfrm>
           <a:prstGeom prst="straightConnector1">
             <a:avLst/>
@@ -4082,6 +4324,855 @@
     <p:extLst>
       <p:ext uri="{BB962C8B-B14F-4D97-AF65-F5344CB8AC3E}">
         <p14:creationId xmlns:p14="http://schemas.microsoft.com/office/powerpoint/2010/main" val="834425203"/>
+      </p:ext>
+    </p:extLst>
+  </p:cSld>
+  <p:clrMapOvr>
+    <a:masterClrMapping/>
+  </p:clrMapOvr>
+</p:sld>
+</file>
+
+<file path=ppt/slides/slide2.xml><?xml version="1.0" encoding="utf-8"?>
+<p:sld xmlns:a="http://schemas.openxmlformats.org/drawingml/2006/main" xmlns:r="http://schemas.openxmlformats.org/officeDocument/2006/relationships" xmlns:p="http://schemas.openxmlformats.org/presentationml/2006/main">
+  <p:cSld>
+    <p:spTree>
+      <p:nvGrpSpPr>
+        <p:cNvPr id="1" name=""/>
+        <p:cNvGrpSpPr/>
+        <p:nvPr/>
+      </p:nvGrpSpPr>
+      <p:grpSpPr>
+        <a:xfrm>
+          <a:off x="0" y="0"/>
+          <a:ext cx="0" cy="0"/>
+          <a:chOff x="0" y="0"/>
+          <a:chExt cx="0" cy="0"/>
+        </a:xfrm>
+      </p:grpSpPr>
+      <p:sp>
+        <p:nvSpPr>
+          <p:cNvPr id="59" name="Rectangle 58">
+            <a:extLst>
+              <a:ext uri="{FF2B5EF4-FFF2-40B4-BE49-F238E27FC236}">
+                <a16:creationId xmlns:a16="http://schemas.microsoft.com/office/drawing/2014/main" id="{D614718C-1ED6-64EA-06B1-FE619507F983}"/>
+              </a:ext>
+            </a:extLst>
+          </p:cNvPr>
+          <p:cNvSpPr/>
+          <p:nvPr/>
+        </p:nvSpPr>
+        <p:spPr>
+          <a:xfrm>
+            <a:off x="3851694" y="116785"/>
+            <a:ext cx="3648974" cy="4679831"/>
+          </a:xfrm>
+          <a:prstGeom prst="rect">
+            <a:avLst/>
+          </a:prstGeom>
+        </p:spPr>
+        <p:style>
+          <a:lnRef idx="2">
+            <a:schemeClr val="accent3">
+              <a:shade val="50000"/>
+            </a:schemeClr>
+          </a:lnRef>
+          <a:fillRef idx="1">
+            <a:schemeClr val="accent3"/>
+          </a:fillRef>
+          <a:effectRef idx="0">
+            <a:schemeClr val="accent3"/>
+          </a:effectRef>
+          <a:fontRef idx="minor">
+            <a:schemeClr val="lt1"/>
+          </a:fontRef>
+        </p:style>
+        <p:txBody>
+          <a:bodyPr rtlCol="0" anchor="ctr"/>
+          <a:lstStyle/>
+          <a:p>
+            <a:pPr algn="ctr"/>
+            <a:endParaRPr lang="en-AU" dirty="0"/>
+          </a:p>
+        </p:txBody>
+      </p:sp>
+      <p:sp>
+        <p:nvSpPr>
+          <p:cNvPr id="49" name="Rectangle 48">
+            <a:extLst>
+              <a:ext uri="{FF2B5EF4-FFF2-40B4-BE49-F238E27FC236}">
+                <a16:creationId xmlns:a16="http://schemas.microsoft.com/office/drawing/2014/main" id="{046FC4EA-C2D9-752A-F083-DE6A47D3A280}"/>
+              </a:ext>
+            </a:extLst>
+          </p:cNvPr>
+          <p:cNvSpPr/>
+          <p:nvPr/>
+        </p:nvSpPr>
+        <p:spPr>
+          <a:xfrm>
+            <a:off x="0" y="116785"/>
+            <a:ext cx="3648974" cy="4679831"/>
+          </a:xfrm>
+          <a:prstGeom prst="rect">
+            <a:avLst/>
+          </a:prstGeom>
+        </p:spPr>
+        <p:style>
+          <a:lnRef idx="2">
+            <a:schemeClr val="accent3">
+              <a:shade val="50000"/>
+            </a:schemeClr>
+          </a:lnRef>
+          <a:fillRef idx="1">
+            <a:schemeClr val="accent3"/>
+          </a:fillRef>
+          <a:effectRef idx="0">
+            <a:schemeClr val="accent3"/>
+          </a:effectRef>
+          <a:fontRef idx="minor">
+            <a:schemeClr val="lt1"/>
+          </a:fontRef>
+        </p:style>
+        <p:txBody>
+          <a:bodyPr rtlCol="0" anchor="ctr"/>
+          <a:lstStyle/>
+          <a:p>
+            <a:pPr algn="ctr"/>
+            <a:endParaRPr lang="en-AU" dirty="0"/>
+          </a:p>
+        </p:txBody>
+      </p:sp>
+      <p:sp>
+        <p:nvSpPr>
+          <p:cNvPr id="4" name="Rectangle 3">
+            <a:extLst>
+              <a:ext uri="{FF2B5EF4-FFF2-40B4-BE49-F238E27FC236}">
+                <a16:creationId xmlns:a16="http://schemas.microsoft.com/office/drawing/2014/main" id="{859361C6-DB84-91B6-6474-A06A8E909681}"/>
+              </a:ext>
+            </a:extLst>
+          </p:cNvPr>
+          <p:cNvSpPr/>
+          <p:nvPr/>
+        </p:nvSpPr>
+        <p:spPr>
+          <a:xfrm>
+            <a:off x="124997" y="592958"/>
+            <a:ext cx="1699491" cy="951346"/>
+          </a:xfrm>
+          <a:prstGeom prst="rect">
+            <a:avLst/>
+          </a:prstGeom>
+        </p:spPr>
+        <p:style>
+          <a:lnRef idx="2">
+            <a:schemeClr val="accent1">
+              <a:shade val="50000"/>
+            </a:schemeClr>
+          </a:lnRef>
+          <a:fillRef idx="1">
+            <a:schemeClr val="accent1"/>
+          </a:fillRef>
+          <a:effectRef idx="0">
+            <a:schemeClr val="accent1"/>
+          </a:effectRef>
+          <a:fontRef idx="minor">
+            <a:schemeClr val="lt1"/>
+          </a:fontRef>
+        </p:style>
+        <p:txBody>
+          <a:bodyPr rtlCol="0" anchor="ctr"/>
+          <a:lstStyle/>
+          <a:p>
+            <a:pPr algn="ctr"/>
+            <a:r>
+              <a:rPr lang="en-GB" dirty="0"/>
+              <a:t>Cryptocompare.com</a:t>
+            </a:r>
+            <a:endParaRPr lang="en-AU" dirty="0"/>
+          </a:p>
+        </p:txBody>
+      </p:sp>
+      <p:sp>
+        <p:nvSpPr>
+          <p:cNvPr id="5" name="Rectangle 4">
+            <a:extLst>
+              <a:ext uri="{FF2B5EF4-FFF2-40B4-BE49-F238E27FC236}">
+                <a16:creationId xmlns:a16="http://schemas.microsoft.com/office/drawing/2014/main" id="{CC1A650F-1839-DFD5-2A22-E7C04A3B5A9E}"/>
+              </a:ext>
+            </a:extLst>
+          </p:cNvPr>
+          <p:cNvSpPr/>
+          <p:nvPr/>
+        </p:nvSpPr>
+        <p:spPr>
+          <a:xfrm>
+            <a:off x="124996" y="1688512"/>
+            <a:ext cx="1699491" cy="951346"/>
+          </a:xfrm>
+          <a:prstGeom prst="rect">
+            <a:avLst/>
+          </a:prstGeom>
+        </p:spPr>
+        <p:style>
+          <a:lnRef idx="2">
+            <a:schemeClr val="accent1">
+              <a:shade val="50000"/>
+            </a:schemeClr>
+          </a:lnRef>
+          <a:fillRef idx="1">
+            <a:schemeClr val="accent1"/>
+          </a:fillRef>
+          <a:effectRef idx="0">
+            <a:schemeClr val="accent1"/>
+          </a:effectRef>
+          <a:fontRef idx="minor">
+            <a:schemeClr val="lt1"/>
+          </a:fontRef>
+        </p:style>
+        <p:txBody>
+          <a:bodyPr rtlCol="0" anchor="ctr"/>
+          <a:lstStyle/>
+          <a:p>
+            <a:pPr algn="ctr"/>
+            <a:r>
+              <a:rPr lang="en-GB" dirty="0"/>
+              <a:t>Yahoo finance </a:t>
+            </a:r>
+            <a:endParaRPr lang="en-AU" dirty="0"/>
+          </a:p>
+        </p:txBody>
+      </p:sp>
+      <p:sp>
+        <p:nvSpPr>
+          <p:cNvPr id="6" name="Rectangle 5">
+            <a:extLst>
+              <a:ext uri="{FF2B5EF4-FFF2-40B4-BE49-F238E27FC236}">
+                <a16:creationId xmlns:a16="http://schemas.microsoft.com/office/drawing/2014/main" id="{F0E424BD-6F92-BF7C-C257-97C31EA4103D}"/>
+              </a:ext>
+            </a:extLst>
+          </p:cNvPr>
+          <p:cNvSpPr/>
+          <p:nvPr/>
+        </p:nvSpPr>
+        <p:spPr>
+          <a:xfrm>
+            <a:off x="124996" y="2784066"/>
+            <a:ext cx="1699491" cy="951346"/>
+          </a:xfrm>
+          <a:prstGeom prst="rect">
+            <a:avLst/>
+          </a:prstGeom>
+        </p:spPr>
+        <p:style>
+          <a:lnRef idx="2">
+            <a:schemeClr val="accent1">
+              <a:shade val="50000"/>
+            </a:schemeClr>
+          </a:lnRef>
+          <a:fillRef idx="1">
+            <a:schemeClr val="accent1"/>
+          </a:fillRef>
+          <a:effectRef idx="0">
+            <a:schemeClr val="accent1"/>
+          </a:effectRef>
+          <a:fontRef idx="minor">
+            <a:schemeClr val="lt1"/>
+          </a:fontRef>
+        </p:style>
+        <p:txBody>
+          <a:bodyPr rtlCol="0" anchor="ctr"/>
+          <a:lstStyle/>
+          <a:p>
+            <a:pPr algn="ctr"/>
+            <a:r>
+              <a:rPr lang="en-GB" dirty="0"/>
+              <a:t>Investing.com</a:t>
+            </a:r>
+            <a:endParaRPr lang="en-AU" dirty="0"/>
+          </a:p>
+        </p:txBody>
+      </p:sp>
+      <p:cxnSp>
+        <p:nvCxnSpPr>
+          <p:cNvPr id="8" name="Straight Arrow Connector 7">
+            <a:extLst>
+              <a:ext uri="{FF2B5EF4-FFF2-40B4-BE49-F238E27FC236}">
+                <a16:creationId xmlns:a16="http://schemas.microsoft.com/office/drawing/2014/main" id="{41C1E85E-33B6-DA00-7BB5-E7C9AE81EEEC}"/>
+              </a:ext>
+            </a:extLst>
+          </p:cNvPr>
+          <p:cNvCxnSpPr>
+            <a:cxnSpLocks/>
+            <a:stCxn id="4" idx="3"/>
+            <a:endCxn id="21" idx="2"/>
+          </p:cNvCxnSpPr>
+          <p:nvPr/>
+        </p:nvCxnSpPr>
+        <p:spPr>
+          <a:xfrm>
+            <a:off x="1824488" y="1068631"/>
+            <a:ext cx="767838" cy="0"/>
+          </a:xfrm>
+          <a:prstGeom prst="straightConnector1">
+            <a:avLst/>
+          </a:prstGeom>
+          <a:ln>
+            <a:tailEnd type="triangle"/>
+          </a:ln>
+        </p:spPr>
+        <p:style>
+          <a:lnRef idx="1">
+            <a:schemeClr val="accent1"/>
+          </a:lnRef>
+          <a:fillRef idx="0">
+            <a:schemeClr val="accent1"/>
+          </a:fillRef>
+          <a:effectRef idx="0">
+            <a:schemeClr val="accent1"/>
+          </a:effectRef>
+          <a:fontRef idx="minor">
+            <a:schemeClr val="tx1"/>
+          </a:fontRef>
+        </p:style>
+      </p:cxnSp>
+      <p:cxnSp>
+        <p:nvCxnSpPr>
+          <p:cNvPr id="11" name="Straight Arrow Connector 10">
+            <a:extLst>
+              <a:ext uri="{FF2B5EF4-FFF2-40B4-BE49-F238E27FC236}">
+                <a16:creationId xmlns:a16="http://schemas.microsoft.com/office/drawing/2014/main" id="{1865E325-A08C-5157-EA5D-C52AE4812776}"/>
+              </a:ext>
+            </a:extLst>
+          </p:cNvPr>
+          <p:cNvCxnSpPr>
+            <a:cxnSpLocks/>
+            <a:stCxn id="5" idx="3"/>
+            <a:endCxn id="20" idx="2"/>
+          </p:cNvCxnSpPr>
+          <p:nvPr/>
+        </p:nvCxnSpPr>
+        <p:spPr>
+          <a:xfrm flipV="1">
+            <a:off x="1824487" y="2149570"/>
+            <a:ext cx="767839" cy="14615"/>
+          </a:xfrm>
+          <a:prstGeom prst="straightConnector1">
+            <a:avLst/>
+          </a:prstGeom>
+          <a:ln>
+            <a:tailEnd type="triangle"/>
+          </a:ln>
+        </p:spPr>
+        <p:style>
+          <a:lnRef idx="1">
+            <a:schemeClr val="accent1"/>
+          </a:lnRef>
+          <a:fillRef idx="0">
+            <a:schemeClr val="accent1"/>
+          </a:fillRef>
+          <a:effectRef idx="0">
+            <a:schemeClr val="accent1"/>
+          </a:effectRef>
+          <a:fontRef idx="minor">
+            <a:schemeClr val="tx1"/>
+          </a:fontRef>
+        </p:style>
+      </p:cxnSp>
+      <p:cxnSp>
+        <p:nvCxnSpPr>
+          <p:cNvPr id="14" name="Straight Arrow Connector 13">
+            <a:extLst>
+              <a:ext uri="{FF2B5EF4-FFF2-40B4-BE49-F238E27FC236}">
+                <a16:creationId xmlns:a16="http://schemas.microsoft.com/office/drawing/2014/main" id="{7DF54CC5-F18E-83FE-5CE4-C9E4B4317C74}"/>
+              </a:ext>
+            </a:extLst>
+          </p:cNvPr>
+          <p:cNvCxnSpPr>
+            <a:cxnSpLocks/>
+            <a:stCxn id="6" idx="3"/>
+            <a:endCxn id="22" idx="2"/>
+          </p:cNvCxnSpPr>
+          <p:nvPr/>
+        </p:nvCxnSpPr>
+        <p:spPr>
+          <a:xfrm flipV="1">
+            <a:off x="1824487" y="3245124"/>
+            <a:ext cx="767839" cy="14615"/>
+          </a:xfrm>
+          <a:prstGeom prst="straightConnector1">
+            <a:avLst/>
+          </a:prstGeom>
+          <a:ln>
+            <a:tailEnd type="triangle"/>
+          </a:ln>
+        </p:spPr>
+        <p:style>
+          <a:lnRef idx="1">
+            <a:schemeClr val="accent1"/>
+          </a:lnRef>
+          <a:fillRef idx="0">
+            <a:schemeClr val="accent1"/>
+          </a:fillRef>
+          <a:effectRef idx="0">
+            <a:schemeClr val="accent1"/>
+          </a:effectRef>
+          <a:fontRef idx="minor">
+            <a:schemeClr val="tx1"/>
+          </a:fontRef>
+        </p:style>
+      </p:cxnSp>
+      <p:sp>
+        <p:nvSpPr>
+          <p:cNvPr id="20" name="Cylinder 19">
+            <a:extLst>
+              <a:ext uri="{FF2B5EF4-FFF2-40B4-BE49-F238E27FC236}">
+                <a16:creationId xmlns:a16="http://schemas.microsoft.com/office/drawing/2014/main" id="{89E9DD70-FC25-2BC5-EFFB-80BA62D1D380}"/>
+              </a:ext>
+            </a:extLst>
+          </p:cNvPr>
+          <p:cNvSpPr/>
+          <p:nvPr/>
+        </p:nvSpPr>
+        <p:spPr>
+          <a:xfrm>
+            <a:off x="2592326" y="1608262"/>
+            <a:ext cx="836762" cy="1082615"/>
+          </a:xfrm>
+          <a:prstGeom prst="can">
+            <a:avLst/>
+          </a:prstGeom>
+        </p:spPr>
+        <p:style>
+          <a:lnRef idx="2">
+            <a:schemeClr val="accent1">
+              <a:shade val="50000"/>
+            </a:schemeClr>
+          </a:lnRef>
+          <a:fillRef idx="1">
+            <a:schemeClr val="accent1"/>
+          </a:fillRef>
+          <a:effectRef idx="0">
+            <a:schemeClr val="accent1"/>
+          </a:effectRef>
+          <a:fontRef idx="minor">
+            <a:schemeClr val="lt1"/>
+          </a:fontRef>
+        </p:style>
+        <p:txBody>
+          <a:bodyPr rtlCol="0" anchor="ctr"/>
+          <a:lstStyle/>
+          <a:p>
+            <a:pPr algn="ctr"/>
+            <a:r>
+              <a:rPr lang="en-GB" sz="1000" dirty="0"/>
+              <a:t>Table: </a:t>
+            </a:r>
+            <a:r>
+              <a:rPr lang="en-GB" sz="1000" dirty="0" err="1"/>
+              <a:t>xrp_price_yahoo</a:t>
+            </a:r>
+            <a:endParaRPr lang="en-AU" sz="1000" dirty="0"/>
+          </a:p>
+        </p:txBody>
+      </p:sp>
+      <p:sp>
+        <p:nvSpPr>
+          <p:cNvPr id="21" name="Cylinder 20">
+            <a:extLst>
+              <a:ext uri="{FF2B5EF4-FFF2-40B4-BE49-F238E27FC236}">
+                <a16:creationId xmlns:a16="http://schemas.microsoft.com/office/drawing/2014/main" id="{3719F581-D177-E07E-72F5-4935CAEA70C2}"/>
+              </a:ext>
+            </a:extLst>
+          </p:cNvPr>
+          <p:cNvSpPr/>
+          <p:nvPr/>
+        </p:nvSpPr>
+        <p:spPr>
+          <a:xfrm>
+            <a:off x="2592326" y="527323"/>
+            <a:ext cx="836762" cy="1082615"/>
+          </a:xfrm>
+          <a:prstGeom prst="can">
+            <a:avLst/>
+          </a:prstGeom>
+        </p:spPr>
+        <p:style>
+          <a:lnRef idx="2">
+            <a:schemeClr val="accent1">
+              <a:shade val="50000"/>
+            </a:schemeClr>
+          </a:lnRef>
+          <a:fillRef idx="1">
+            <a:schemeClr val="accent1"/>
+          </a:fillRef>
+          <a:effectRef idx="0">
+            <a:schemeClr val="accent1"/>
+          </a:effectRef>
+          <a:fontRef idx="minor">
+            <a:schemeClr val="lt1"/>
+          </a:fontRef>
+        </p:style>
+        <p:txBody>
+          <a:bodyPr rtlCol="0" anchor="ctr"/>
+          <a:lstStyle/>
+          <a:p>
+            <a:pPr algn="ctr"/>
+            <a:r>
+              <a:rPr lang="en-GB" sz="1000" dirty="0"/>
+              <a:t>Table: </a:t>
+            </a:r>
+            <a:r>
+              <a:rPr lang="en-GB" sz="1000" dirty="0" err="1"/>
+              <a:t>cryptocompare</a:t>
+            </a:r>
+            <a:endParaRPr lang="en-AU" sz="1000" dirty="0"/>
+          </a:p>
+        </p:txBody>
+      </p:sp>
+      <p:sp>
+        <p:nvSpPr>
+          <p:cNvPr id="22" name="Cylinder 21">
+            <a:extLst>
+              <a:ext uri="{FF2B5EF4-FFF2-40B4-BE49-F238E27FC236}">
+                <a16:creationId xmlns:a16="http://schemas.microsoft.com/office/drawing/2014/main" id="{5BB1C09A-8749-96E5-D6D3-CEEC8D314123}"/>
+              </a:ext>
+            </a:extLst>
+          </p:cNvPr>
+          <p:cNvSpPr/>
+          <p:nvPr/>
+        </p:nvSpPr>
+        <p:spPr>
+          <a:xfrm>
+            <a:off x="2592326" y="2703816"/>
+            <a:ext cx="836762" cy="1082615"/>
+          </a:xfrm>
+          <a:prstGeom prst="can">
+            <a:avLst/>
+          </a:prstGeom>
+        </p:spPr>
+        <p:style>
+          <a:lnRef idx="2">
+            <a:schemeClr val="accent1">
+              <a:shade val="50000"/>
+            </a:schemeClr>
+          </a:lnRef>
+          <a:fillRef idx="1">
+            <a:schemeClr val="accent1"/>
+          </a:fillRef>
+          <a:effectRef idx="0">
+            <a:schemeClr val="accent1"/>
+          </a:effectRef>
+          <a:fontRef idx="minor">
+            <a:schemeClr val="lt1"/>
+          </a:fontRef>
+        </p:style>
+        <p:txBody>
+          <a:bodyPr rtlCol="0" anchor="ctr"/>
+          <a:lstStyle/>
+          <a:p>
+            <a:pPr algn="ctr"/>
+            <a:r>
+              <a:rPr lang="en-GB" sz="1000" dirty="0"/>
+              <a:t>Table: </a:t>
+            </a:r>
+            <a:r>
+              <a:rPr lang="en-GB" sz="1000" dirty="0" err="1"/>
+              <a:t>investingcom_xrp</a:t>
+            </a:r>
+            <a:endParaRPr lang="en-AU" sz="1000" dirty="0"/>
+          </a:p>
+        </p:txBody>
+      </p:sp>
+      <p:sp>
+        <p:nvSpPr>
+          <p:cNvPr id="50" name="TextBox 49">
+            <a:extLst>
+              <a:ext uri="{FF2B5EF4-FFF2-40B4-BE49-F238E27FC236}">
+                <a16:creationId xmlns:a16="http://schemas.microsoft.com/office/drawing/2014/main" id="{4CCED4A7-2E89-D400-17B4-26DDAA4880CB}"/>
+              </a:ext>
+            </a:extLst>
+          </p:cNvPr>
+          <p:cNvSpPr txBox="1"/>
+          <p:nvPr/>
+        </p:nvSpPr>
+        <p:spPr>
+          <a:xfrm>
+            <a:off x="245811" y="3873286"/>
+            <a:ext cx="3234994" cy="923330"/>
+          </a:xfrm>
+          <a:prstGeom prst="rect">
+            <a:avLst/>
+          </a:prstGeom>
+          <a:noFill/>
+        </p:spPr>
+        <p:txBody>
+          <a:bodyPr wrap="square" rtlCol="0">
+            <a:spAutoFit/>
+          </a:bodyPr>
+          <a:lstStyle/>
+          <a:p>
+            <a:r>
+              <a:rPr lang="en-GB" dirty="0"/>
+              <a:t>Task 2: Extract, transform and load data</a:t>
+            </a:r>
+          </a:p>
+          <a:p>
+            <a:r>
+              <a:rPr lang="en-GB" dirty="0"/>
+              <a:t>1-webcrawller.isbp</a:t>
+            </a:r>
+            <a:endParaRPr lang="en-AU" dirty="0"/>
+          </a:p>
+        </p:txBody>
+      </p:sp>
+      <p:cxnSp>
+        <p:nvCxnSpPr>
+          <p:cNvPr id="51" name="Straight Arrow Connector 50">
+            <a:extLst>
+              <a:ext uri="{FF2B5EF4-FFF2-40B4-BE49-F238E27FC236}">
+                <a16:creationId xmlns:a16="http://schemas.microsoft.com/office/drawing/2014/main" id="{D9716277-EFB3-0DE7-385D-EF326BF8EE84}"/>
+              </a:ext>
+            </a:extLst>
+          </p:cNvPr>
+          <p:cNvCxnSpPr>
+            <a:cxnSpLocks/>
+            <a:stCxn id="21" idx="4"/>
+          </p:cNvCxnSpPr>
+          <p:nvPr/>
+        </p:nvCxnSpPr>
+        <p:spPr>
+          <a:xfrm>
+            <a:off x="3429088" y="1068631"/>
+            <a:ext cx="987724" cy="1067998"/>
+          </a:xfrm>
+          <a:prstGeom prst="straightConnector1">
+            <a:avLst/>
+          </a:prstGeom>
+          <a:ln>
+            <a:tailEnd type="triangle"/>
+          </a:ln>
+        </p:spPr>
+        <p:style>
+          <a:lnRef idx="1">
+            <a:schemeClr val="accent1"/>
+          </a:lnRef>
+          <a:fillRef idx="0">
+            <a:schemeClr val="accent1"/>
+          </a:fillRef>
+          <a:effectRef idx="0">
+            <a:schemeClr val="accent1"/>
+          </a:effectRef>
+          <a:fontRef idx="minor">
+            <a:schemeClr val="tx1"/>
+          </a:fontRef>
+        </p:style>
+      </p:cxnSp>
+      <p:cxnSp>
+        <p:nvCxnSpPr>
+          <p:cNvPr id="54" name="Straight Arrow Connector 53">
+            <a:extLst>
+              <a:ext uri="{FF2B5EF4-FFF2-40B4-BE49-F238E27FC236}">
+                <a16:creationId xmlns:a16="http://schemas.microsoft.com/office/drawing/2014/main" id="{B126DBE7-8C52-B30F-B934-AA9C41ED25DA}"/>
+              </a:ext>
+            </a:extLst>
+          </p:cNvPr>
+          <p:cNvCxnSpPr>
+            <a:cxnSpLocks/>
+            <a:stCxn id="20" idx="4"/>
+          </p:cNvCxnSpPr>
+          <p:nvPr/>
+        </p:nvCxnSpPr>
+        <p:spPr>
+          <a:xfrm>
+            <a:off x="3429088" y="2149570"/>
+            <a:ext cx="987725" cy="14615"/>
+          </a:xfrm>
+          <a:prstGeom prst="straightConnector1">
+            <a:avLst/>
+          </a:prstGeom>
+          <a:ln>
+            <a:tailEnd type="triangle"/>
+          </a:ln>
+        </p:spPr>
+        <p:style>
+          <a:lnRef idx="1">
+            <a:schemeClr val="accent1"/>
+          </a:lnRef>
+          <a:fillRef idx="0">
+            <a:schemeClr val="accent1"/>
+          </a:fillRef>
+          <a:effectRef idx="0">
+            <a:schemeClr val="accent1"/>
+          </a:effectRef>
+          <a:fontRef idx="minor">
+            <a:schemeClr val="tx1"/>
+          </a:fontRef>
+        </p:style>
+      </p:cxnSp>
+      <p:cxnSp>
+        <p:nvCxnSpPr>
+          <p:cNvPr id="56" name="Straight Arrow Connector 55">
+            <a:extLst>
+              <a:ext uri="{FF2B5EF4-FFF2-40B4-BE49-F238E27FC236}">
+                <a16:creationId xmlns:a16="http://schemas.microsoft.com/office/drawing/2014/main" id="{766EC8C4-559D-19C7-8825-CDDAD15C638F}"/>
+              </a:ext>
+            </a:extLst>
+          </p:cNvPr>
+          <p:cNvCxnSpPr>
+            <a:cxnSpLocks/>
+            <a:stCxn id="22" idx="4"/>
+          </p:cNvCxnSpPr>
+          <p:nvPr/>
+        </p:nvCxnSpPr>
+        <p:spPr>
+          <a:xfrm flipV="1">
+            <a:off x="3429088" y="2177124"/>
+            <a:ext cx="987724" cy="1068000"/>
+          </a:xfrm>
+          <a:prstGeom prst="straightConnector1">
+            <a:avLst/>
+          </a:prstGeom>
+          <a:ln>
+            <a:tailEnd type="triangle"/>
+          </a:ln>
+        </p:spPr>
+        <p:style>
+          <a:lnRef idx="1">
+            <a:schemeClr val="accent1"/>
+          </a:lnRef>
+          <a:fillRef idx="0">
+            <a:schemeClr val="accent1"/>
+          </a:fillRef>
+          <a:effectRef idx="0">
+            <a:schemeClr val="accent1"/>
+          </a:effectRef>
+          <a:fontRef idx="minor">
+            <a:schemeClr val="tx1"/>
+          </a:fontRef>
+        </p:style>
+      </p:cxnSp>
+      <p:sp>
+        <p:nvSpPr>
+          <p:cNvPr id="60" name="TextBox 59">
+            <a:extLst>
+              <a:ext uri="{FF2B5EF4-FFF2-40B4-BE49-F238E27FC236}">
+                <a16:creationId xmlns:a16="http://schemas.microsoft.com/office/drawing/2014/main" id="{B1291DF9-C436-5FEA-723D-C84DC1785122}"/>
+              </a:ext>
+            </a:extLst>
+          </p:cNvPr>
+          <p:cNvSpPr txBox="1"/>
+          <p:nvPr/>
+        </p:nvSpPr>
+        <p:spPr>
+          <a:xfrm>
+            <a:off x="3851694" y="4150285"/>
+            <a:ext cx="3234994" cy="369332"/>
+          </a:xfrm>
+          <a:prstGeom prst="rect">
+            <a:avLst/>
+          </a:prstGeom>
+          <a:noFill/>
+        </p:spPr>
+        <p:txBody>
+          <a:bodyPr wrap="square" rtlCol="0">
+            <a:spAutoFit/>
+          </a:bodyPr>
+          <a:lstStyle/>
+          <a:p>
+            <a:r>
+              <a:rPr lang="en-GB" dirty="0"/>
+              <a:t>Task 3: NLP</a:t>
+            </a:r>
+            <a:endParaRPr lang="en-AU" dirty="0"/>
+          </a:p>
+        </p:txBody>
+      </p:sp>
+      <p:sp>
+        <p:nvSpPr>
+          <p:cNvPr id="61" name="Rectangle 60">
+            <a:extLst>
+              <a:ext uri="{FF2B5EF4-FFF2-40B4-BE49-F238E27FC236}">
+                <a16:creationId xmlns:a16="http://schemas.microsoft.com/office/drawing/2014/main" id="{2A6691AB-74B9-2CAA-90D6-22B9DF70F3ED}"/>
+              </a:ext>
+            </a:extLst>
+          </p:cNvPr>
+          <p:cNvSpPr/>
+          <p:nvPr/>
+        </p:nvSpPr>
+        <p:spPr>
+          <a:xfrm>
+            <a:off x="7775187" y="116785"/>
+            <a:ext cx="3648974" cy="4679831"/>
+          </a:xfrm>
+          <a:prstGeom prst="rect">
+            <a:avLst/>
+          </a:prstGeom>
+        </p:spPr>
+        <p:style>
+          <a:lnRef idx="2">
+            <a:schemeClr val="accent3">
+              <a:shade val="50000"/>
+            </a:schemeClr>
+          </a:lnRef>
+          <a:fillRef idx="1">
+            <a:schemeClr val="accent3"/>
+          </a:fillRef>
+          <a:effectRef idx="0">
+            <a:schemeClr val="accent3"/>
+          </a:effectRef>
+          <a:fontRef idx="minor">
+            <a:schemeClr val="lt1"/>
+          </a:fontRef>
+        </p:style>
+        <p:txBody>
+          <a:bodyPr rtlCol="0" anchor="ctr"/>
+          <a:lstStyle/>
+          <a:p>
+            <a:pPr algn="ctr"/>
+            <a:endParaRPr lang="en-AU" dirty="0"/>
+          </a:p>
+        </p:txBody>
+      </p:sp>
+      <p:sp>
+        <p:nvSpPr>
+          <p:cNvPr id="62" name="TextBox 61">
+            <a:extLst>
+              <a:ext uri="{FF2B5EF4-FFF2-40B4-BE49-F238E27FC236}">
+                <a16:creationId xmlns:a16="http://schemas.microsoft.com/office/drawing/2014/main" id="{9C08D9A5-98D1-2A1F-5AFC-B97DBC71B7F1}"/>
+              </a:ext>
+            </a:extLst>
+          </p:cNvPr>
+          <p:cNvSpPr txBox="1"/>
+          <p:nvPr/>
+        </p:nvSpPr>
+        <p:spPr>
+          <a:xfrm>
+            <a:off x="7982177" y="4150285"/>
+            <a:ext cx="3234994" cy="369332"/>
+          </a:xfrm>
+          <a:prstGeom prst="rect">
+            <a:avLst/>
+          </a:prstGeom>
+          <a:noFill/>
+        </p:spPr>
+        <p:txBody>
+          <a:bodyPr wrap="square" rtlCol="0">
+            <a:spAutoFit/>
+          </a:bodyPr>
+          <a:lstStyle/>
+          <a:p>
+            <a:r>
+              <a:rPr lang="en-GB" dirty="0"/>
+              <a:t>Task 4: Machine learning model</a:t>
+            </a:r>
+            <a:endParaRPr lang="en-AU" dirty="0"/>
+          </a:p>
+        </p:txBody>
+      </p:sp>
+    </p:spTree>
+    <p:extLst>
+      <p:ext uri="{BB962C8B-B14F-4D97-AF65-F5344CB8AC3E}">
+        <p14:creationId xmlns:p14="http://schemas.microsoft.com/office/powerpoint/2010/main" val="1268113905"/>
       </p:ext>
     </p:extLst>
   </p:cSld>

</xml_diff>

<commit_message>
Commit all chnages to git
</commit_message>
<xml_diff>
--- a/task1/model_diagram.pptx
+++ b/task1/model_diagram.pptx
@@ -126,7 +126,7 @@
   <pc:docChgLst>
     <pc:chgData name="Jayden Dzierbicki" userId="e5925774-a98c-41a3-99b4-5f1dd09761a3" providerId="ADAL" clId="{A10B9406-4157-47E1-9855-C10D8547A56A}"/>
     <pc:docChg chg="undo custSel addSld modSld">
-      <pc:chgData name="Jayden Dzierbicki" userId="e5925774-a98c-41a3-99b4-5f1dd09761a3" providerId="ADAL" clId="{A10B9406-4157-47E1-9855-C10D8547A56A}" dt="2023-04-14T08:54:36.178" v="315" actId="14100"/>
+      <pc:chgData name="Jayden Dzierbicki" userId="e5925774-a98c-41a3-99b4-5f1dd09761a3" providerId="ADAL" clId="{A10B9406-4157-47E1-9855-C10D8547A56A}" dt="2023-04-15T04:02:22.611" v="317" actId="1076"/>
       <pc:docMkLst>
         <pc:docMk/>
       </pc:docMkLst>
@@ -162,7 +162,7 @@
         </pc:cxnChg>
       </pc:sldChg>
       <pc:sldChg chg="addSp delSp modSp new mod">
-        <pc:chgData name="Jayden Dzierbicki" userId="e5925774-a98c-41a3-99b4-5f1dd09761a3" providerId="ADAL" clId="{A10B9406-4157-47E1-9855-C10D8547A56A}" dt="2023-04-14T08:54:36.178" v="315" actId="14100"/>
+        <pc:chgData name="Jayden Dzierbicki" userId="e5925774-a98c-41a3-99b4-5f1dd09761a3" providerId="ADAL" clId="{A10B9406-4157-47E1-9855-C10D8547A56A}" dt="2023-04-15T04:02:22.611" v="317" actId="1076"/>
         <pc:sldMkLst>
           <pc:docMk/>
           <pc:sldMk cId="1268113905" sldId="257"/>
@@ -184,7 +184,7 @@
           </ac:spMkLst>
         </pc:spChg>
         <pc:spChg chg="add mod">
-          <ac:chgData name="Jayden Dzierbicki" userId="e5925774-a98c-41a3-99b4-5f1dd09761a3" providerId="ADAL" clId="{A10B9406-4157-47E1-9855-C10D8547A56A}" dt="2023-04-14T08:50:28.399" v="258" actId="1076"/>
+          <ac:chgData name="Jayden Dzierbicki" userId="e5925774-a98c-41a3-99b4-5f1dd09761a3" providerId="ADAL" clId="{A10B9406-4157-47E1-9855-C10D8547A56A}" dt="2023-04-15T04:02:22.611" v="317" actId="1076"/>
           <ac:spMkLst>
             <pc:docMk/>
             <pc:sldMk cId="1268113905" sldId="257"/>
@@ -192,7 +192,7 @@
           </ac:spMkLst>
         </pc:spChg>
         <pc:spChg chg="add mod">
-          <ac:chgData name="Jayden Dzierbicki" userId="e5925774-a98c-41a3-99b4-5f1dd09761a3" providerId="ADAL" clId="{A10B9406-4157-47E1-9855-C10D8547A56A}" dt="2023-04-14T08:50:28.399" v="258" actId="1076"/>
+          <ac:chgData name="Jayden Dzierbicki" userId="e5925774-a98c-41a3-99b4-5f1dd09761a3" providerId="ADAL" clId="{A10B9406-4157-47E1-9855-C10D8547A56A}" dt="2023-04-15T04:02:22.611" v="317" actId="1076"/>
           <ac:spMkLst>
             <pc:docMk/>
             <pc:sldMk cId="1268113905" sldId="257"/>
@@ -200,7 +200,7 @@
           </ac:spMkLst>
         </pc:spChg>
         <pc:spChg chg="add mod">
-          <ac:chgData name="Jayden Dzierbicki" userId="e5925774-a98c-41a3-99b4-5f1dd09761a3" providerId="ADAL" clId="{A10B9406-4157-47E1-9855-C10D8547A56A}" dt="2023-04-14T08:50:28.399" v="258" actId="1076"/>
+          <ac:chgData name="Jayden Dzierbicki" userId="e5925774-a98c-41a3-99b4-5f1dd09761a3" providerId="ADAL" clId="{A10B9406-4157-47E1-9855-C10D8547A56A}" dt="2023-04-15T04:02:22.611" v="317" actId="1076"/>
           <ac:spMkLst>
             <pc:docMk/>
             <pc:sldMk cId="1268113905" sldId="257"/>
@@ -216,7 +216,7 @@
           </ac:spMkLst>
         </pc:spChg>
         <pc:spChg chg="add mod">
-          <ac:chgData name="Jayden Dzierbicki" userId="e5925774-a98c-41a3-99b4-5f1dd09761a3" providerId="ADAL" clId="{A10B9406-4157-47E1-9855-C10D8547A56A}" dt="2023-04-14T08:50:28.399" v="258" actId="1076"/>
+          <ac:chgData name="Jayden Dzierbicki" userId="e5925774-a98c-41a3-99b4-5f1dd09761a3" providerId="ADAL" clId="{A10B9406-4157-47E1-9855-C10D8547A56A}" dt="2023-04-15T04:02:22.611" v="317" actId="1076"/>
           <ac:spMkLst>
             <pc:docMk/>
             <pc:sldMk cId="1268113905" sldId="257"/>
@@ -224,7 +224,7 @@
           </ac:spMkLst>
         </pc:spChg>
         <pc:spChg chg="add mod">
-          <ac:chgData name="Jayden Dzierbicki" userId="e5925774-a98c-41a3-99b4-5f1dd09761a3" providerId="ADAL" clId="{A10B9406-4157-47E1-9855-C10D8547A56A}" dt="2023-04-14T08:50:28.399" v="258" actId="1076"/>
+          <ac:chgData name="Jayden Dzierbicki" userId="e5925774-a98c-41a3-99b4-5f1dd09761a3" providerId="ADAL" clId="{A10B9406-4157-47E1-9855-C10D8547A56A}" dt="2023-04-15T04:02:22.611" v="317" actId="1076"/>
           <ac:spMkLst>
             <pc:docMk/>
             <pc:sldMk cId="1268113905" sldId="257"/>
@@ -232,7 +232,7 @@
           </ac:spMkLst>
         </pc:spChg>
         <pc:spChg chg="add mod">
-          <ac:chgData name="Jayden Dzierbicki" userId="e5925774-a98c-41a3-99b4-5f1dd09761a3" providerId="ADAL" clId="{A10B9406-4157-47E1-9855-C10D8547A56A}" dt="2023-04-14T08:50:28.399" v="258" actId="1076"/>
+          <ac:chgData name="Jayden Dzierbicki" userId="e5925774-a98c-41a3-99b4-5f1dd09761a3" providerId="ADAL" clId="{A10B9406-4157-47E1-9855-C10D8547A56A}" dt="2023-04-15T04:02:22.611" v="317" actId="1076"/>
           <ac:spMkLst>
             <pc:docMk/>
             <pc:sldMk cId="1268113905" sldId="257"/>
@@ -240,7 +240,7 @@
           </ac:spMkLst>
         </pc:spChg>
         <pc:spChg chg="add mod ord">
-          <ac:chgData name="Jayden Dzierbicki" userId="e5925774-a98c-41a3-99b4-5f1dd09761a3" providerId="ADAL" clId="{A10B9406-4157-47E1-9855-C10D8547A56A}" dt="2023-04-14T08:53:26.983" v="313" actId="14100"/>
+          <ac:chgData name="Jayden Dzierbicki" userId="e5925774-a98c-41a3-99b4-5f1dd09761a3" providerId="ADAL" clId="{A10B9406-4157-47E1-9855-C10D8547A56A}" dt="2023-04-15T04:02:22.611" v="317" actId="1076"/>
           <ac:spMkLst>
             <pc:docMk/>
             <pc:sldMk cId="1268113905" sldId="257"/>
@@ -248,7 +248,7 @@
           </ac:spMkLst>
         </pc:spChg>
         <pc:spChg chg="add mod">
-          <ac:chgData name="Jayden Dzierbicki" userId="e5925774-a98c-41a3-99b4-5f1dd09761a3" providerId="ADAL" clId="{A10B9406-4157-47E1-9855-C10D8547A56A}" dt="2023-04-14T08:51:38.814" v="270" actId="20577"/>
+          <ac:chgData name="Jayden Dzierbicki" userId="e5925774-a98c-41a3-99b4-5f1dd09761a3" providerId="ADAL" clId="{A10B9406-4157-47E1-9855-C10D8547A56A}" dt="2023-04-15T04:02:22.611" v="317" actId="1076"/>
           <ac:spMkLst>
             <pc:docMk/>
             <pc:sldMk cId="1268113905" sldId="257"/>
@@ -256,7 +256,7 @@
           </ac:spMkLst>
         </pc:spChg>
         <pc:spChg chg="add mod ord">
-          <ac:chgData name="Jayden Dzierbicki" userId="e5925774-a98c-41a3-99b4-5f1dd09761a3" providerId="ADAL" clId="{A10B9406-4157-47E1-9855-C10D8547A56A}" dt="2023-04-14T08:52:01.081" v="281" actId="1076"/>
+          <ac:chgData name="Jayden Dzierbicki" userId="e5925774-a98c-41a3-99b4-5f1dd09761a3" providerId="ADAL" clId="{A10B9406-4157-47E1-9855-C10D8547A56A}" dt="2023-04-15T04:02:22.611" v="317" actId="1076"/>
           <ac:spMkLst>
             <pc:docMk/>
             <pc:sldMk cId="1268113905" sldId="257"/>
@@ -264,7 +264,7 @@
           </ac:spMkLst>
         </pc:spChg>
         <pc:spChg chg="add mod">
-          <ac:chgData name="Jayden Dzierbicki" userId="e5925774-a98c-41a3-99b4-5f1dd09761a3" providerId="ADAL" clId="{A10B9406-4157-47E1-9855-C10D8547A56A}" dt="2023-04-14T08:52:03.053" v="282" actId="1076"/>
+          <ac:chgData name="Jayden Dzierbicki" userId="e5925774-a98c-41a3-99b4-5f1dd09761a3" providerId="ADAL" clId="{A10B9406-4157-47E1-9855-C10D8547A56A}" dt="2023-04-15T04:02:22.611" v="317" actId="1076"/>
           <ac:spMkLst>
             <pc:docMk/>
             <pc:sldMk cId="1268113905" sldId="257"/>
@@ -272,7 +272,7 @@
           </ac:spMkLst>
         </pc:spChg>
         <pc:spChg chg="add mod">
-          <ac:chgData name="Jayden Dzierbicki" userId="e5925774-a98c-41a3-99b4-5f1dd09761a3" providerId="ADAL" clId="{A10B9406-4157-47E1-9855-C10D8547A56A}" dt="2023-04-14T08:52:06.034" v="284" actId="1076"/>
+          <ac:chgData name="Jayden Dzierbicki" userId="e5925774-a98c-41a3-99b4-5f1dd09761a3" providerId="ADAL" clId="{A10B9406-4157-47E1-9855-C10D8547A56A}" dt="2023-04-15T04:02:22.611" v="317" actId="1076"/>
           <ac:spMkLst>
             <pc:docMk/>
             <pc:sldMk cId="1268113905" sldId="257"/>
@@ -280,7 +280,7 @@
           </ac:spMkLst>
         </pc:spChg>
         <pc:spChg chg="add mod">
-          <ac:chgData name="Jayden Dzierbicki" userId="e5925774-a98c-41a3-99b4-5f1dd09761a3" providerId="ADAL" clId="{A10B9406-4157-47E1-9855-C10D8547A56A}" dt="2023-04-14T08:52:20.364" v="310" actId="20577"/>
+          <ac:chgData name="Jayden Dzierbicki" userId="e5925774-a98c-41a3-99b4-5f1dd09761a3" providerId="ADAL" clId="{A10B9406-4157-47E1-9855-C10D8547A56A}" dt="2023-04-15T04:02:22.611" v="317" actId="1076"/>
           <ac:spMkLst>
             <pc:docMk/>
             <pc:sldMk cId="1268113905" sldId="257"/>
@@ -288,7 +288,7 @@
           </ac:spMkLst>
         </pc:spChg>
         <pc:cxnChg chg="add mod">
-          <ac:chgData name="Jayden Dzierbicki" userId="e5925774-a98c-41a3-99b4-5f1dd09761a3" providerId="ADAL" clId="{A10B9406-4157-47E1-9855-C10D8547A56A}" dt="2023-04-14T08:50:28.399" v="258" actId="1076"/>
+          <ac:chgData name="Jayden Dzierbicki" userId="e5925774-a98c-41a3-99b4-5f1dd09761a3" providerId="ADAL" clId="{A10B9406-4157-47E1-9855-C10D8547A56A}" dt="2023-04-15T04:02:22.611" v="317" actId="1076"/>
           <ac:cxnSpMkLst>
             <pc:docMk/>
             <pc:sldMk cId="1268113905" sldId="257"/>
@@ -296,7 +296,7 @@
           </ac:cxnSpMkLst>
         </pc:cxnChg>
         <pc:cxnChg chg="add mod">
-          <ac:chgData name="Jayden Dzierbicki" userId="e5925774-a98c-41a3-99b4-5f1dd09761a3" providerId="ADAL" clId="{A10B9406-4157-47E1-9855-C10D8547A56A}" dt="2023-04-14T08:50:28.399" v="258" actId="1076"/>
+          <ac:chgData name="Jayden Dzierbicki" userId="e5925774-a98c-41a3-99b4-5f1dd09761a3" providerId="ADAL" clId="{A10B9406-4157-47E1-9855-C10D8547A56A}" dt="2023-04-15T04:02:22.611" v="317" actId="1076"/>
           <ac:cxnSpMkLst>
             <pc:docMk/>
             <pc:sldMk cId="1268113905" sldId="257"/>
@@ -304,7 +304,7 @@
           </ac:cxnSpMkLst>
         </pc:cxnChg>
         <pc:cxnChg chg="add mod">
-          <ac:chgData name="Jayden Dzierbicki" userId="e5925774-a98c-41a3-99b4-5f1dd09761a3" providerId="ADAL" clId="{A10B9406-4157-47E1-9855-C10D8547A56A}" dt="2023-04-14T08:50:28.399" v="258" actId="1076"/>
+          <ac:chgData name="Jayden Dzierbicki" userId="e5925774-a98c-41a3-99b4-5f1dd09761a3" providerId="ADAL" clId="{A10B9406-4157-47E1-9855-C10D8547A56A}" dt="2023-04-15T04:02:22.611" v="317" actId="1076"/>
           <ac:cxnSpMkLst>
             <pc:docMk/>
             <pc:sldMk cId="1268113905" sldId="257"/>
@@ -320,7 +320,7 @@
           </ac:cxnSpMkLst>
         </pc:cxnChg>
         <pc:cxnChg chg="add mod">
-          <ac:chgData name="Jayden Dzierbicki" userId="e5925774-a98c-41a3-99b4-5f1dd09761a3" providerId="ADAL" clId="{A10B9406-4157-47E1-9855-C10D8547A56A}" dt="2023-04-14T08:54:33.740" v="314" actId="14100"/>
+          <ac:chgData name="Jayden Dzierbicki" userId="e5925774-a98c-41a3-99b4-5f1dd09761a3" providerId="ADAL" clId="{A10B9406-4157-47E1-9855-C10D8547A56A}" dt="2023-04-15T04:02:22.611" v="317" actId="1076"/>
           <ac:cxnSpMkLst>
             <pc:docMk/>
             <pc:sldMk cId="1268113905" sldId="257"/>
@@ -328,7 +328,7 @@
           </ac:cxnSpMkLst>
         </pc:cxnChg>
         <pc:cxnChg chg="add mod">
-          <ac:chgData name="Jayden Dzierbicki" userId="e5925774-a98c-41a3-99b4-5f1dd09761a3" providerId="ADAL" clId="{A10B9406-4157-47E1-9855-C10D8547A56A}" dt="2023-04-14T08:52:26.192" v="311" actId="14100"/>
+          <ac:chgData name="Jayden Dzierbicki" userId="e5925774-a98c-41a3-99b4-5f1dd09761a3" providerId="ADAL" clId="{A10B9406-4157-47E1-9855-C10D8547A56A}" dt="2023-04-15T04:02:22.611" v="317" actId="1076"/>
           <ac:cxnSpMkLst>
             <pc:docMk/>
             <pc:sldMk cId="1268113905" sldId="257"/>
@@ -336,7 +336,7 @@
           </ac:cxnSpMkLst>
         </pc:cxnChg>
         <pc:cxnChg chg="add mod">
-          <ac:chgData name="Jayden Dzierbicki" userId="e5925774-a98c-41a3-99b4-5f1dd09761a3" providerId="ADAL" clId="{A10B9406-4157-47E1-9855-C10D8547A56A}" dt="2023-04-14T08:54:36.178" v="315" actId="14100"/>
+          <ac:chgData name="Jayden Dzierbicki" userId="e5925774-a98c-41a3-99b4-5f1dd09761a3" providerId="ADAL" clId="{A10B9406-4157-47E1-9855-C10D8547A56A}" dt="2023-04-15T04:02:22.611" v="317" actId="1076"/>
           <ac:cxnSpMkLst>
             <pc:docMk/>
             <pc:sldMk cId="1268113905" sldId="257"/>
@@ -498,7 +498,7 @@
           <a:p>
             <a:fld id="{DC9180F0-0672-4733-B150-EFAAB25D3A0F}" type="datetimeFigureOut">
               <a:rPr lang="en-AU" smtClean="0"/>
-              <a:t>14/04/2023</a:t>
+              <a:t>15/04/2023</a:t>
             </a:fld>
             <a:endParaRPr lang="en-AU"/>
           </a:p>
@@ -698,7 +698,7 @@
           <a:p>
             <a:fld id="{DC9180F0-0672-4733-B150-EFAAB25D3A0F}" type="datetimeFigureOut">
               <a:rPr lang="en-AU" smtClean="0"/>
-              <a:t>14/04/2023</a:t>
+              <a:t>15/04/2023</a:t>
             </a:fld>
             <a:endParaRPr lang="en-AU"/>
           </a:p>
@@ -908,7 +908,7 @@
           <a:p>
             <a:fld id="{DC9180F0-0672-4733-B150-EFAAB25D3A0F}" type="datetimeFigureOut">
               <a:rPr lang="en-AU" smtClean="0"/>
-              <a:t>14/04/2023</a:t>
+              <a:t>15/04/2023</a:t>
             </a:fld>
             <a:endParaRPr lang="en-AU"/>
           </a:p>
@@ -1108,7 +1108,7 @@
           <a:p>
             <a:fld id="{DC9180F0-0672-4733-B150-EFAAB25D3A0F}" type="datetimeFigureOut">
               <a:rPr lang="en-AU" smtClean="0"/>
-              <a:t>14/04/2023</a:t>
+              <a:t>15/04/2023</a:t>
             </a:fld>
             <a:endParaRPr lang="en-AU"/>
           </a:p>
@@ -1384,7 +1384,7 @@
           <a:p>
             <a:fld id="{DC9180F0-0672-4733-B150-EFAAB25D3A0F}" type="datetimeFigureOut">
               <a:rPr lang="en-AU" smtClean="0"/>
-              <a:t>14/04/2023</a:t>
+              <a:t>15/04/2023</a:t>
             </a:fld>
             <a:endParaRPr lang="en-AU"/>
           </a:p>
@@ -1652,7 +1652,7 @@
           <a:p>
             <a:fld id="{DC9180F0-0672-4733-B150-EFAAB25D3A0F}" type="datetimeFigureOut">
               <a:rPr lang="en-AU" smtClean="0"/>
-              <a:t>14/04/2023</a:t>
+              <a:t>15/04/2023</a:t>
             </a:fld>
             <a:endParaRPr lang="en-AU"/>
           </a:p>
@@ -2067,7 +2067,7 @@
           <a:p>
             <a:fld id="{DC9180F0-0672-4733-B150-EFAAB25D3A0F}" type="datetimeFigureOut">
               <a:rPr lang="en-AU" smtClean="0"/>
-              <a:t>14/04/2023</a:t>
+              <a:t>15/04/2023</a:t>
             </a:fld>
             <a:endParaRPr lang="en-AU"/>
           </a:p>
@@ -2209,7 +2209,7 @@
           <a:p>
             <a:fld id="{DC9180F0-0672-4733-B150-EFAAB25D3A0F}" type="datetimeFigureOut">
               <a:rPr lang="en-AU" smtClean="0"/>
-              <a:t>14/04/2023</a:t>
+              <a:t>15/04/2023</a:t>
             </a:fld>
             <a:endParaRPr lang="en-AU"/>
           </a:p>
@@ -2322,7 +2322,7 @@
           <a:p>
             <a:fld id="{DC9180F0-0672-4733-B150-EFAAB25D3A0F}" type="datetimeFigureOut">
               <a:rPr lang="en-AU" smtClean="0"/>
-              <a:t>14/04/2023</a:t>
+              <a:t>15/04/2023</a:t>
             </a:fld>
             <a:endParaRPr lang="en-AU"/>
           </a:p>
@@ -2635,7 +2635,7 @@
           <a:p>
             <a:fld id="{DC9180F0-0672-4733-B150-EFAAB25D3A0F}" type="datetimeFigureOut">
               <a:rPr lang="en-AU" smtClean="0"/>
-              <a:t>14/04/2023</a:t>
+              <a:t>15/04/2023</a:t>
             </a:fld>
             <a:endParaRPr lang="en-AU"/>
           </a:p>
@@ -2924,7 +2924,7 @@
           <a:p>
             <a:fld id="{DC9180F0-0672-4733-B150-EFAAB25D3A0F}" type="datetimeFigureOut">
               <a:rPr lang="en-AU" smtClean="0"/>
-              <a:t>14/04/2023</a:t>
+              <a:t>15/04/2023</a:t>
             </a:fld>
             <a:endParaRPr lang="en-AU"/>
           </a:p>
@@ -3167,7 +3167,7 @@
           <a:p>
             <a:fld id="{DC9180F0-0672-4733-B150-EFAAB25D3A0F}" type="datetimeFigureOut">
               <a:rPr lang="en-AU" smtClean="0"/>
-              <a:t>14/04/2023</a:t>
+              <a:t>15/04/2023</a:t>
             </a:fld>
             <a:endParaRPr lang="en-AU"/>
           </a:p>
@@ -4364,7 +4364,7 @@
         </p:nvSpPr>
         <p:spPr>
           <a:xfrm>
-            <a:off x="3851694" y="116785"/>
+            <a:off x="4271513" y="1220967"/>
             <a:ext cx="3648974" cy="4679831"/>
           </a:xfrm>
           <a:prstGeom prst="rect">
@@ -4410,7 +4410,7 @@
         </p:nvSpPr>
         <p:spPr>
           <a:xfrm>
-            <a:off x="0" y="116785"/>
+            <a:off x="419819" y="1220967"/>
             <a:ext cx="3648974" cy="4679831"/>
           </a:xfrm>
           <a:prstGeom prst="rect">
@@ -4456,7 +4456,7 @@
         </p:nvSpPr>
         <p:spPr>
           <a:xfrm>
-            <a:off x="124997" y="592958"/>
+            <a:off x="544816" y="1697140"/>
             <a:ext cx="1699491" cy="951346"/>
           </a:xfrm>
           <a:prstGeom prst="rect">
@@ -4506,7 +4506,7 @@
         </p:nvSpPr>
         <p:spPr>
           <a:xfrm>
-            <a:off x="124996" y="1688512"/>
+            <a:off x="544815" y="2792694"/>
             <a:ext cx="1699491" cy="951346"/>
           </a:xfrm>
           <a:prstGeom prst="rect">
@@ -4556,7 +4556,7 @@
         </p:nvSpPr>
         <p:spPr>
           <a:xfrm>
-            <a:off x="124996" y="2784066"/>
+            <a:off x="544815" y="3888248"/>
             <a:ext cx="1699491" cy="951346"/>
           </a:xfrm>
           <a:prstGeom prst="rect">
@@ -4610,7 +4610,7 @@
         </p:nvCxnSpPr>
         <p:spPr>
           <a:xfrm>
-            <a:off x="1824488" y="1068631"/>
+            <a:off x="2244307" y="2172813"/>
             <a:ext cx="767838" cy="0"/>
           </a:xfrm>
           <a:prstGeom prst="straightConnector1">
@@ -4653,7 +4653,7 @@
         </p:nvCxnSpPr>
         <p:spPr>
           <a:xfrm flipV="1">
-            <a:off x="1824487" y="2149570"/>
+            <a:off x="2244306" y="3253752"/>
             <a:ext cx="767839" cy="14615"/>
           </a:xfrm>
           <a:prstGeom prst="straightConnector1">
@@ -4696,8 +4696,8 @@
         </p:nvCxnSpPr>
         <p:spPr>
           <a:xfrm flipV="1">
-            <a:off x="1824487" y="3245124"/>
-            <a:ext cx="767839" cy="14615"/>
+            <a:off x="2244306" y="4336367"/>
+            <a:ext cx="767839" cy="27554"/>
           </a:xfrm>
           <a:prstGeom prst="straightConnector1">
             <a:avLst/>
@@ -4735,7 +4735,7 @@
         </p:nvSpPr>
         <p:spPr>
           <a:xfrm>
-            <a:off x="2592326" y="1608262"/>
+            <a:off x="3012145" y="2712444"/>
             <a:ext cx="836762" cy="1082615"/>
           </a:xfrm>
           <a:prstGeom prst="can">
@@ -4789,7 +4789,7 @@
         </p:nvSpPr>
         <p:spPr>
           <a:xfrm>
-            <a:off x="2592326" y="527323"/>
+            <a:off x="3012145" y="1631505"/>
             <a:ext cx="836762" cy="1082615"/>
           </a:xfrm>
           <a:prstGeom prst="can">
@@ -4843,7 +4843,7 @@
         </p:nvSpPr>
         <p:spPr>
           <a:xfrm>
-            <a:off x="2592326" y="2703816"/>
+            <a:off x="3012145" y="3795059"/>
             <a:ext cx="836762" cy="1082615"/>
           </a:xfrm>
           <a:prstGeom prst="can">
@@ -4897,7 +4897,7 @@
         </p:nvSpPr>
         <p:spPr>
           <a:xfrm>
-            <a:off x="245811" y="3873286"/>
+            <a:off x="665630" y="4977468"/>
             <a:ext cx="3234994" cy="923330"/>
           </a:xfrm>
           <a:prstGeom prst="rect">
@@ -4942,7 +4942,7 @@
         </p:nvCxnSpPr>
         <p:spPr>
           <a:xfrm>
-            <a:off x="3429088" y="1068631"/>
+            <a:off x="3848907" y="2172813"/>
             <a:ext cx="987724" cy="1067998"/>
           </a:xfrm>
           <a:prstGeom prst="straightConnector1">
@@ -4984,7 +4984,7 @@
         </p:nvCxnSpPr>
         <p:spPr>
           <a:xfrm>
-            <a:off x="3429088" y="2149570"/>
+            <a:off x="3848907" y="3253752"/>
             <a:ext cx="987725" cy="14615"/>
           </a:xfrm>
           <a:prstGeom prst="straightConnector1">
@@ -5026,7 +5026,7 @@
         </p:nvCxnSpPr>
         <p:spPr>
           <a:xfrm flipV="1">
-            <a:off x="3429088" y="2177124"/>
+            <a:off x="3848907" y="3268367"/>
             <a:ext cx="987724" cy="1068000"/>
           </a:xfrm>
           <a:prstGeom prst="straightConnector1">
@@ -5065,7 +5065,7 @@
         </p:nvSpPr>
         <p:spPr>
           <a:xfrm>
-            <a:off x="3851694" y="4150285"/>
+            <a:off x="4271513" y="5254467"/>
             <a:ext cx="3234994" cy="369332"/>
           </a:xfrm>
           <a:prstGeom prst="rect">
@@ -5101,7 +5101,7 @@
         </p:nvSpPr>
         <p:spPr>
           <a:xfrm>
-            <a:off x="7775187" y="116785"/>
+            <a:off x="8195006" y="1220967"/>
             <a:ext cx="3648974" cy="4679831"/>
           </a:xfrm>
           <a:prstGeom prst="rect">
@@ -5147,7 +5147,7 @@
         </p:nvSpPr>
         <p:spPr>
           <a:xfrm>
-            <a:off x="7982177" y="4150285"/>
+            <a:off x="8401996" y="5254467"/>
             <a:ext cx="3234994" cy="369332"/>
           </a:xfrm>
           <a:prstGeom prst="rect">

</xml_diff>

<commit_message>
Major update task 1 2 3
</commit_message>
<xml_diff>
--- a/task1/model_diagram.pptx
+++ b/task1/model_diagram.pptx
@@ -116,7 +116,7 @@
 <file path=ppt/revisionInfo.xml><?xml version="1.0" encoding="utf-8"?>
 <p1510:revInfo xmlns:a="http://schemas.openxmlformats.org/drawingml/2006/main" xmlns:r="http://schemas.openxmlformats.org/officeDocument/2006/relationships" xmlns:p1510="http://schemas.microsoft.com/office/powerpoint/2015/10/main">
   <p1510:revLst>
-    <p1510:client id="{A10B9406-4157-47E1-9855-C10D8547A56A}" v="20" dt="2023-04-14T08:52:10.912"/>
+    <p1510:client id="{A10B9406-4157-47E1-9855-C10D8547A56A}" v="23" dt="2023-04-18T09:31:29.819"/>
   </p1510:revLst>
 </p1510:revInfo>
 </file>
@@ -126,7 +126,7 @@
   <pc:docChgLst>
     <pc:chgData name="Jayden Dzierbicki" userId="e5925774-a98c-41a3-99b4-5f1dd09761a3" providerId="ADAL" clId="{A10B9406-4157-47E1-9855-C10D8547A56A}"/>
     <pc:docChg chg="undo custSel addSld modSld">
-      <pc:chgData name="Jayden Dzierbicki" userId="e5925774-a98c-41a3-99b4-5f1dd09761a3" providerId="ADAL" clId="{A10B9406-4157-47E1-9855-C10D8547A56A}" dt="2023-04-15T04:02:22.611" v="317" actId="1076"/>
+      <pc:chgData name="Jayden Dzierbicki" userId="e5925774-a98c-41a3-99b4-5f1dd09761a3" providerId="ADAL" clId="{A10B9406-4157-47E1-9855-C10D8547A56A}" dt="2023-04-18T09:31:21.892" v="320" actId="478"/>
       <pc:docMkLst>
         <pc:docMk/>
       </pc:docMkLst>
@@ -162,7 +162,7 @@
         </pc:cxnChg>
       </pc:sldChg>
       <pc:sldChg chg="addSp delSp modSp new mod">
-        <pc:chgData name="Jayden Dzierbicki" userId="e5925774-a98c-41a3-99b4-5f1dd09761a3" providerId="ADAL" clId="{A10B9406-4157-47E1-9855-C10D8547A56A}" dt="2023-04-15T04:02:22.611" v="317" actId="1076"/>
+        <pc:chgData name="Jayden Dzierbicki" userId="e5925774-a98c-41a3-99b4-5f1dd09761a3" providerId="ADAL" clId="{A10B9406-4157-47E1-9855-C10D8547A56A}" dt="2023-04-18T09:31:21.892" v="320" actId="478"/>
         <pc:sldMkLst>
           <pc:docMk/>
           <pc:sldMk cId="1268113905" sldId="257"/>
@@ -319,24 +319,24 @@
             <ac:cxnSpMk id="31" creationId="{1541105B-CD0B-199D-3BA4-95E4B8A8CDE1}"/>
           </ac:cxnSpMkLst>
         </pc:cxnChg>
-        <pc:cxnChg chg="add mod">
-          <ac:chgData name="Jayden Dzierbicki" userId="e5925774-a98c-41a3-99b4-5f1dd09761a3" providerId="ADAL" clId="{A10B9406-4157-47E1-9855-C10D8547A56A}" dt="2023-04-15T04:02:22.611" v="317" actId="1076"/>
+        <pc:cxnChg chg="add del mod">
+          <ac:chgData name="Jayden Dzierbicki" userId="e5925774-a98c-41a3-99b4-5f1dd09761a3" providerId="ADAL" clId="{A10B9406-4157-47E1-9855-C10D8547A56A}" dt="2023-04-18T09:31:17.155" v="318" actId="478"/>
           <ac:cxnSpMkLst>
             <pc:docMk/>
             <pc:sldMk cId="1268113905" sldId="257"/>
             <ac:cxnSpMk id="51" creationId="{D9716277-EFB3-0DE7-385D-EF326BF8EE84}"/>
           </ac:cxnSpMkLst>
         </pc:cxnChg>
-        <pc:cxnChg chg="add mod">
-          <ac:chgData name="Jayden Dzierbicki" userId="e5925774-a98c-41a3-99b4-5f1dd09761a3" providerId="ADAL" clId="{A10B9406-4157-47E1-9855-C10D8547A56A}" dt="2023-04-15T04:02:22.611" v="317" actId="1076"/>
+        <pc:cxnChg chg="add del mod">
+          <ac:chgData name="Jayden Dzierbicki" userId="e5925774-a98c-41a3-99b4-5f1dd09761a3" providerId="ADAL" clId="{A10B9406-4157-47E1-9855-C10D8547A56A}" dt="2023-04-18T09:31:19.068" v="319" actId="478"/>
           <ac:cxnSpMkLst>
             <pc:docMk/>
             <pc:sldMk cId="1268113905" sldId="257"/>
             <ac:cxnSpMk id="54" creationId="{B126DBE7-8C52-B30F-B934-AA9C41ED25DA}"/>
           </ac:cxnSpMkLst>
         </pc:cxnChg>
-        <pc:cxnChg chg="add mod">
-          <ac:chgData name="Jayden Dzierbicki" userId="e5925774-a98c-41a3-99b4-5f1dd09761a3" providerId="ADAL" clId="{A10B9406-4157-47E1-9855-C10D8547A56A}" dt="2023-04-15T04:02:22.611" v="317" actId="1076"/>
+        <pc:cxnChg chg="add del mod">
+          <ac:chgData name="Jayden Dzierbicki" userId="e5925774-a98c-41a3-99b4-5f1dd09761a3" providerId="ADAL" clId="{A10B9406-4157-47E1-9855-C10D8547A56A}" dt="2023-04-18T09:31:21.892" v="320" actId="478"/>
           <ac:cxnSpMkLst>
             <pc:docMk/>
             <pc:sldMk cId="1268113905" sldId="257"/>
@@ -498,7 +498,7 @@
           <a:p>
             <a:fld id="{DC9180F0-0672-4733-B150-EFAAB25D3A0F}" type="datetimeFigureOut">
               <a:rPr lang="en-AU" smtClean="0"/>
-              <a:t>15/04/2023</a:t>
+              <a:t>18/04/2023</a:t>
             </a:fld>
             <a:endParaRPr lang="en-AU"/>
           </a:p>
@@ -698,7 +698,7 @@
           <a:p>
             <a:fld id="{DC9180F0-0672-4733-B150-EFAAB25D3A0F}" type="datetimeFigureOut">
               <a:rPr lang="en-AU" smtClean="0"/>
-              <a:t>15/04/2023</a:t>
+              <a:t>18/04/2023</a:t>
             </a:fld>
             <a:endParaRPr lang="en-AU"/>
           </a:p>
@@ -908,7 +908,7 @@
           <a:p>
             <a:fld id="{DC9180F0-0672-4733-B150-EFAAB25D3A0F}" type="datetimeFigureOut">
               <a:rPr lang="en-AU" smtClean="0"/>
-              <a:t>15/04/2023</a:t>
+              <a:t>18/04/2023</a:t>
             </a:fld>
             <a:endParaRPr lang="en-AU"/>
           </a:p>
@@ -1108,7 +1108,7 @@
           <a:p>
             <a:fld id="{DC9180F0-0672-4733-B150-EFAAB25D3A0F}" type="datetimeFigureOut">
               <a:rPr lang="en-AU" smtClean="0"/>
-              <a:t>15/04/2023</a:t>
+              <a:t>18/04/2023</a:t>
             </a:fld>
             <a:endParaRPr lang="en-AU"/>
           </a:p>
@@ -1384,7 +1384,7 @@
           <a:p>
             <a:fld id="{DC9180F0-0672-4733-B150-EFAAB25D3A0F}" type="datetimeFigureOut">
               <a:rPr lang="en-AU" smtClean="0"/>
-              <a:t>15/04/2023</a:t>
+              <a:t>18/04/2023</a:t>
             </a:fld>
             <a:endParaRPr lang="en-AU"/>
           </a:p>
@@ -1652,7 +1652,7 @@
           <a:p>
             <a:fld id="{DC9180F0-0672-4733-B150-EFAAB25D3A0F}" type="datetimeFigureOut">
               <a:rPr lang="en-AU" smtClean="0"/>
-              <a:t>15/04/2023</a:t>
+              <a:t>18/04/2023</a:t>
             </a:fld>
             <a:endParaRPr lang="en-AU"/>
           </a:p>
@@ -2067,7 +2067,7 @@
           <a:p>
             <a:fld id="{DC9180F0-0672-4733-B150-EFAAB25D3A0F}" type="datetimeFigureOut">
               <a:rPr lang="en-AU" smtClean="0"/>
-              <a:t>15/04/2023</a:t>
+              <a:t>18/04/2023</a:t>
             </a:fld>
             <a:endParaRPr lang="en-AU"/>
           </a:p>
@@ -2209,7 +2209,7 @@
           <a:p>
             <a:fld id="{DC9180F0-0672-4733-B150-EFAAB25D3A0F}" type="datetimeFigureOut">
               <a:rPr lang="en-AU" smtClean="0"/>
-              <a:t>15/04/2023</a:t>
+              <a:t>18/04/2023</a:t>
             </a:fld>
             <a:endParaRPr lang="en-AU"/>
           </a:p>
@@ -2322,7 +2322,7 @@
           <a:p>
             <a:fld id="{DC9180F0-0672-4733-B150-EFAAB25D3A0F}" type="datetimeFigureOut">
               <a:rPr lang="en-AU" smtClean="0"/>
-              <a:t>15/04/2023</a:t>
+              <a:t>18/04/2023</a:t>
             </a:fld>
             <a:endParaRPr lang="en-AU"/>
           </a:p>
@@ -2635,7 +2635,7 @@
           <a:p>
             <a:fld id="{DC9180F0-0672-4733-B150-EFAAB25D3A0F}" type="datetimeFigureOut">
               <a:rPr lang="en-AU" smtClean="0"/>
-              <a:t>15/04/2023</a:t>
+              <a:t>18/04/2023</a:t>
             </a:fld>
             <a:endParaRPr lang="en-AU"/>
           </a:p>
@@ -2924,7 +2924,7 @@
           <a:p>
             <a:fld id="{DC9180F0-0672-4733-B150-EFAAB25D3A0F}" type="datetimeFigureOut">
               <a:rPr lang="en-AU" smtClean="0"/>
-              <a:t>15/04/2023</a:t>
+              <a:t>18/04/2023</a:t>
             </a:fld>
             <a:endParaRPr lang="en-AU"/>
           </a:p>
@@ -3167,7 +3167,7 @@
           <a:p>
             <a:fld id="{DC9180F0-0672-4733-B150-EFAAB25D3A0F}" type="datetimeFigureOut">
               <a:rPr lang="en-AU" smtClean="0"/>
-              <a:t>15/04/2023</a:t>
+              <a:t>18/04/2023</a:t>
             </a:fld>
             <a:endParaRPr lang="en-AU"/>
           </a:p>
@@ -3685,12 +3685,8 @@
           <a:p>
             <a:pPr algn="ctr"/>
             <a:r>
-              <a:rPr lang="en-GB" sz="1000" dirty="0" err="1"/>
-              <a:t>Cryptocompare_xrp</a:t>
-            </a:r>
-            <a:r>
               <a:rPr lang="en-GB" sz="1000" dirty="0"/>
-              <a:t> table</a:t>
+              <a:t>table</a:t>
             </a:r>
             <a:endParaRPr lang="en-AU" sz="1000" dirty="0"/>
           </a:p>
@@ -3950,7 +3946,7 @@
         </p:nvSpPr>
         <p:spPr>
           <a:xfrm>
-            <a:off x="2852381" y="627462"/>
+            <a:off x="4548952" y="620817"/>
             <a:ext cx="1699491" cy="951346"/>
           </a:xfrm>
           <a:prstGeom prst="rect">
@@ -4000,7 +3996,7 @@
         </p:nvSpPr>
         <p:spPr>
           <a:xfrm>
-            <a:off x="3280826" y="2113470"/>
+            <a:off x="3280825" y="2346385"/>
             <a:ext cx="836762" cy="1082615"/>
           </a:xfrm>
           <a:prstGeom prst="can">
@@ -4066,8 +4062,8 @@
         </p:nvCxnSpPr>
         <p:spPr>
           <a:xfrm flipH="1">
-            <a:off x="3699207" y="1578808"/>
-            <a:ext cx="2920" cy="534662"/>
+            <a:off x="3699206" y="1572163"/>
+            <a:ext cx="1699492" cy="774222"/>
           </a:xfrm>
           <a:prstGeom prst="straightConnector1">
             <a:avLst/>
@@ -4159,8 +4155,8 @@
         </p:nvCxnSpPr>
         <p:spPr>
           <a:xfrm>
-            <a:off x="3699207" y="3196085"/>
-            <a:ext cx="0" cy="1749309"/>
+            <a:off x="3699206" y="3429000"/>
+            <a:ext cx="1" cy="1516394"/>
           </a:xfrm>
           <a:prstGeom prst="straightConnector1">
             <a:avLst/>
@@ -4320,6 +4316,99 @@
           </a:p>
         </p:txBody>
       </p:sp>
+      <p:sp>
+        <p:nvSpPr>
+          <p:cNvPr id="2" name="Rectangle 1">
+            <a:extLst>
+              <a:ext uri="{FF2B5EF4-FFF2-40B4-BE49-F238E27FC236}">
+                <a16:creationId xmlns:a16="http://schemas.microsoft.com/office/drawing/2014/main" id="{88DE188D-87A1-9119-B7F6-EA47669976E9}"/>
+              </a:ext>
+            </a:extLst>
+          </p:cNvPr>
+          <p:cNvSpPr/>
+          <p:nvPr/>
+        </p:nvSpPr>
+        <p:spPr>
+          <a:xfrm>
+            <a:off x="2559104" y="620817"/>
+            <a:ext cx="1699491" cy="951346"/>
+          </a:xfrm>
+          <a:prstGeom prst="rect">
+            <a:avLst/>
+          </a:prstGeom>
+        </p:spPr>
+        <p:style>
+          <a:lnRef idx="2">
+            <a:schemeClr val="accent1">
+              <a:shade val="50000"/>
+            </a:schemeClr>
+          </a:lnRef>
+          <a:fillRef idx="1">
+            <a:schemeClr val="accent1"/>
+          </a:fillRef>
+          <a:effectRef idx="0">
+            <a:schemeClr val="accent1"/>
+          </a:effectRef>
+          <a:fontRef idx="minor">
+            <a:schemeClr val="lt1"/>
+          </a:fontRef>
+        </p:style>
+        <p:txBody>
+          <a:bodyPr rtlCol="0" anchor="ctr"/>
+          <a:lstStyle/>
+          <a:p>
+            <a:pPr algn="ctr"/>
+            <a:r>
+              <a:rPr lang="en-GB" dirty="0"/>
+              <a:t>Investing.com</a:t>
+            </a:r>
+            <a:endParaRPr lang="en-AU" dirty="0"/>
+          </a:p>
+        </p:txBody>
+      </p:sp>
+      <p:cxnSp>
+        <p:nvCxnSpPr>
+          <p:cNvPr id="12" name="Straight Arrow Connector 11">
+            <a:extLst>
+              <a:ext uri="{FF2B5EF4-FFF2-40B4-BE49-F238E27FC236}">
+                <a16:creationId xmlns:a16="http://schemas.microsoft.com/office/drawing/2014/main" id="{02D0E08D-20FC-8583-5B32-45D42A49E89B}"/>
+              </a:ext>
+            </a:extLst>
+          </p:cNvPr>
+          <p:cNvCxnSpPr>
+            <a:cxnSpLocks/>
+            <a:stCxn id="2" idx="2"/>
+            <a:endCxn id="5" idx="1"/>
+          </p:cNvCxnSpPr>
+          <p:nvPr/>
+        </p:nvCxnSpPr>
+        <p:spPr>
+          <a:xfrm flipH="1">
+            <a:off x="1419001" y="1572163"/>
+            <a:ext cx="1989849" cy="541308"/>
+          </a:xfrm>
+          <a:prstGeom prst="straightConnector1">
+            <a:avLst/>
+          </a:prstGeom>
+          <a:ln>
+            <a:tailEnd type="triangle"/>
+          </a:ln>
+        </p:spPr>
+        <p:style>
+          <a:lnRef idx="1">
+            <a:schemeClr val="accent1"/>
+          </a:lnRef>
+          <a:fillRef idx="0">
+            <a:schemeClr val="accent1"/>
+          </a:fillRef>
+          <a:effectRef idx="0">
+            <a:schemeClr val="accent1"/>
+          </a:effectRef>
+          <a:fontRef idx="minor">
+            <a:schemeClr val="tx1"/>
+          </a:fontRef>
+        </p:style>
+      </p:cxnSp>
     </p:spTree>
     <p:extLst>
       <p:ext uri="{BB962C8B-B14F-4D97-AF65-F5344CB8AC3E}">
@@ -4765,11 +4854,7 @@
             <a:pPr algn="ctr"/>
             <a:r>
               <a:rPr lang="en-GB" sz="1000" dirty="0"/>
-              <a:t>Table: </a:t>
-            </a:r>
-            <a:r>
-              <a:rPr lang="en-GB" sz="1000" dirty="0" err="1"/>
-              <a:t>xrp_price_yahoo</a:t>
+              <a:t>Table: xrp_price_yahoo</a:t>
             </a:r>
             <a:endParaRPr lang="en-AU" sz="1000" dirty="0"/>
           </a:p>
@@ -4819,11 +4904,7 @@
             <a:pPr algn="ctr"/>
             <a:r>
               <a:rPr lang="en-GB" sz="1000" dirty="0"/>
-              <a:t>Table: </a:t>
-            </a:r>
-            <a:r>
-              <a:rPr lang="en-GB" sz="1000" dirty="0" err="1"/>
-              <a:t>cryptocompare</a:t>
+              <a:t>Table: cryptocompare</a:t>
             </a:r>
             <a:endParaRPr lang="en-AU" sz="1000" dirty="0"/>
           </a:p>
@@ -4873,11 +4954,7 @@
             <a:pPr algn="ctr"/>
             <a:r>
               <a:rPr lang="en-GB" sz="1000" dirty="0"/>
-              <a:t>Table: </a:t>
-            </a:r>
-            <a:r>
-              <a:rPr lang="en-GB" sz="1000" dirty="0" err="1"/>
-              <a:t>investingcom_xrp</a:t>
+              <a:t>Table: investingcom_xrp</a:t>
             </a:r>
             <a:endParaRPr lang="en-AU" sz="1000" dirty="0"/>
           </a:p>
@@ -4925,132 +5002,6 @@
           </a:p>
         </p:txBody>
       </p:sp>
-      <p:cxnSp>
-        <p:nvCxnSpPr>
-          <p:cNvPr id="51" name="Straight Arrow Connector 50">
-            <a:extLst>
-              <a:ext uri="{FF2B5EF4-FFF2-40B4-BE49-F238E27FC236}">
-                <a16:creationId xmlns:a16="http://schemas.microsoft.com/office/drawing/2014/main" id="{D9716277-EFB3-0DE7-385D-EF326BF8EE84}"/>
-              </a:ext>
-            </a:extLst>
-          </p:cNvPr>
-          <p:cNvCxnSpPr>
-            <a:cxnSpLocks/>
-            <a:stCxn id="21" idx="4"/>
-          </p:cNvCxnSpPr>
-          <p:nvPr/>
-        </p:nvCxnSpPr>
-        <p:spPr>
-          <a:xfrm>
-            <a:off x="3848907" y="2172813"/>
-            <a:ext cx="987724" cy="1067998"/>
-          </a:xfrm>
-          <a:prstGeom prst="straightConnector1">
-            <a:avLst/>
-          </a:prstGeom>
-          <a:ln>
-            <a:tailEnd type="triangle"/>
-          </a:ln>
-        </p:spPr>
-        <p:style>
-          <a:lnRef idx="1">
-            <a:schemeClr val="accent1"/>
-          </a:lnRef>
-          <a:fillRef idx="0">
-            <a:schemeClr val="accent1"/>
-          </a:fillRef>
-          <a:effectRef idx="0">
-            <a:schemeClr val="accent1"/>
-          </a:effectRef>
-          <a:fontRef idx="minor">
-            <a:schemeClr val="tx1"/>
-          </a:fontRef>
-        </p:style>
-      </p:cxnSp>
-      <p:cxnSp>
-        <p:nvCxnSpPr>
-          <p:cNvPr id="54" name="Straight Arrow Connector 53">
-            <a:extLst>
-              <a:ext uri="{FF2B5EF4-FFF2-40B4-BE49-F238E27FC236}">
-                <a16:creationId xmlns:a16="http://schemas.microsoft.com/office/drawing/2014/main" id="{B126DBE7-8C52-B30F-B934-AA9C41ED25DA}"/>
-              </a:ext>
-            </a:extLst>
-          </p:cNvPr>
-          <p:cNvCxnSpPr>
-            <a:cxnSpLocks/>
-            <a:stCxn id="20" idx="4"/>
-          </p:cNvCxnSpPr>
-          <p:nvPr/>
-        </p:nvCxnSpPr>
-        <p:spPr>
-          <a:xfrm>
-            <a:off x="3848907" y="3253752"/>
-            <a:ext cx="987725" cy="14615"/>
-          </a:xfrm>
-          <a:prstGeom prst="straightConnector1">
-            <a:avLst/>
-          </a:prstGeom>
-          <a:ln>
-            <a:tailEnd type="triangle"/>
-          </a:ln>
-        </p:spPr>
-        <p:style>
-          <a:lnRef idx="1">
-            <a:schemeClr val="accent1"/>
-          </a:lnRef>
-          <a:fillRef idx="0">
-            <a:schemeClr val="accent1"/>
-          </a:fillRef>
-          <a:effectRef idx="0">
-            <a:schemeClr val="accent1"/>
-          </a:effectRef>
-          <a:fontRef idx="minor">
-            <a:schemeClr val="tx1"/>
-          </a:fontRef>
-        </p:style>
-      </p:cxnSp>
-      <p:cxnSp>
-        <p:nvCxnSpPr>
-          <p:cNvPr id="56" name="Straight Arrow Connector 55">
-            <a:extLst>
-              <a:ext uri="{FF2B5EF4-FFF2-40B4-BE49-F238E27FC236}">
-                <a16:creationId xmlns:a16="http://schemas.microsoft.com/office/drawing/2014/main" id="{766EC8C4-559D-19C7-8825-CDDAD15C638F}"/>
-              </a:ext>
-            </a:extLst>
-          </p:cNvPr>
-          <p:cNvCxnSpPr>
-            <a:cxnSpLocks/>
-            <a:stCxn id="22" idx="4"/>
-          </p:cNvCxnSpPr>
-          <p:nvPr/>
-        </p:nvCxnSpPr>
-        <p:spPr>
-          <a:xfrm flipV="1">
-            <a:off x="3848907" y="3268367"/>
-            <a:ext cx="987724" cy="1068000"/>
-          </a:xfrm>
-          <a:prstGeom prst="straightConnector1">
-            <a:avLst/>
-          </a:prstGeom>
-          <a:ln>
-            <a:tailEnd type="triangle"/>
-          </a:ln>
-        </p:spPr>
-        <p:style>
-          <a:lnRef idx="1">
-            <a:schemeClr val="accent1"/>
-          </a:lnRef>
-          <a:fillRef idx="0">
-            <a:schemeClr val="accent1"/>
-          </a:fillRef>
-          <a:effectRef idx="0">
-            <a:schemeClr val="accent1"/>
-          </a:effectRef>
-          <a:fontRef idx="minor">
-            <a:schemeClr val="tx1"/>
-          </a:fontRef>
-        </p:style>
-      </p:cxnSp>
       <p:sp>
         <p:nvSpPr>
           <p:cNvPr id="60" name="TextBox 59">

</xml_diff>